<commit_message>
update syllabus : SPA vs MPA
</commit_message>
<xml_diff>
--- a/syllabus/13_formulaire_HTML/syllabus_13_form.pptx
+++ b/syllabus/13_formulaire_HTML/syllabus_13_form.pptx
@@ -302,7 +302,7 @@
           <a:p>
             <a:fld id="{FCE9742F-4DAE-47F5-9244-6ACC3985DD6B}" type="datetimeFigureOut">
               <a:rPr lang="fr-BE" smtClean="0"/>
-              <a:t>09-09-25</a:t>
+              <a:t>24-11-25</a:t>
             </a:fld>
             <a:endParaRPr lang="fr-BE"/>
           </a:p>
@@ -3045,7 +3045,7 @@
           <a:p>
             <a:fld id="{F3953782-D06E-4853-BE3C-64C197273937}" type="datetimeFigureOut">
               <a:rPr lang="fr-BE" smtClean="0"/>
-              <a:t>09-09-25</a:t>
+              <a:t>24-11-25</a:t>
             </a:fld>
             <a:endParaRPr lang="fr-BE"/>
           </a:p>
@@ -4913,7 +4913,7 @@
           <a:p>
             <a:fld id="{F3953782-D06E-4853-BE3C-64C197273937}" type="datetimeFigureOut">
               <a:rPr lang="fr-BE" smtClean="0"/>
-              <a:t>09-09-25</a:t>
+              <a:t>24-11-25</a:t>
             </a:fld>
             <a:endParaRPr lang="fr-BE"/>
           </a:p>
@@ -5229,7 +5229,7 @@
           <a:p>
             <a:fld id="{F3953782-D06E-4853-BE3C-64C197273937}" type="datetimeFigureOut">
               <a:rPr lang="fr-BE" smtClean="0"/>
-              <a:t>09-09-25</a:t>
+              <a:t>24-11-25</a:t>
             </a:fld>
             <a:endParaRPr lang="fr-BE"/>
           </a:p>
@@ -5426,7 +5426,7 @@
           <a:p>
             <a:fld id="{F3953782-D06E-4853-BE3C-64C197273937}" type="datetimeFigureOut">
               <a:rPr lang="fr-BE" smtClean="0"/>
-              <a:t>09-09-25</a:t>
+              <a:t>24-11-25</a:t>
             </a:fld>
             <a:endParaRPr lang="fr-BE"/>
           </a:p>
@@ -5688,7 +5688,7 @@
           <a:p>
             <a:fld id="{F3953782-D06E-4853-BE3C-64C197273937}" type="datetimeFigureOut">
               <a:rPr lang="fr-BE" smtClean="0"/>
-              <a:t>09-09-25</a:t>
+              <a:t>24-11-25</a:t>
             </a:fld>
             <a:endParaRPr lang="fr-BE"/>
           </a:p>
@@ -6086,7 +6086,7 @@
           <a:p>
             <a:fld id="{F3953782-D06E-4853-BE3C-64C197273937}" type="datetimeFigureOut">
               <a:rPr lang="fr-BE" smtClean="0"/>
-              <a:t>09-09-25</a:t>
+              <a:t>24-11-25</a:t>
             </a:fld>
             <a:endParaRPr lang="fr-BE"/>
           </a:p>
@@ -6234,7 +6234,7 @@
           <a:p>
             <a:fld id="{F3953782-D06E-4853-BE3C-64C197273937}" type="datetimeFigureOut">
               <a:rPr lang="fr-BE" smtClean="0"/>
-              <a:t>09-09-25</a:t>
+              <a:t>24-11-25</a:t>
             </a:fld>
             <a:endParaRPr lang="fr-BE"/>
           </a:p>
@@ -6583,7 +6583,7 @@
           <a:p>
             <a:fld id="{F3953782-D06E-4853-BE3C-64C197273937}" type="datetimeFigureOut">
               <a:rPr lang="fr-BE" smtClean="0"/>
-              <a:t>09-09-25</a:t>
+              <a:t>24-11-25</a:t>
             </a:fld>
             <a:endParaRPr lang="fr-BE"/>
           </a:p>
@@ -6909,7 +6909,7 @@
           <a:p>
             <a:fld id="{F3953782-D06E-4853-BE3C-64C197273937}" type="datetimeFigureOut">
               <a:rPr lang="fr-BE" smtClean="0"/>
-              <a:t>09-09-25</a:t>
+              <a:t>24-11-25</a:t>
             </a:fld>
             <a:endParaRPr lang="fr-BE"/>
           </a:p>
@@ -7560,7 +7560,7 @@
         <p14:reveal/>
       </p:transition>
     </mc:Choice>
-    <mc:Fallback xmlns="" xmlns:mv="urn:schemas-microsoft-com:mac:vml" xmlns:c="http://schemas.openxmlformats.org/drawingml/2006/chart" xmlns:dgm="http://schemas.openxmlformats.org/drawingml/2006/diagram" xmlns:o="urn:schemas-microsoft-com:office:office" xmlns:v="urn:schemas-microsoft-com:vml" xmlns:pvml="urn:schemas-microsoft-com:office:powerpoint" xmlns:com="http://schemas.openxmlformats.org/drawingml/2006/compatibility" xmlns:p15="http://schemas.microsoft.com/office/powerpoint/2012/main" xmlns:ahyp="http://schemas.microsoft.com/office/drawing/2018/hyperlinkcolor">
+    <mc:Fallback xmlns:ahyp="http://schemas.microsoft.com/office/drawing/2018/hyperlinkcolor" xmlns:p15="http://schemas.microsoft.com/office/powerpoint/2012/main" xmlns:com="http://schemas.openxmlformats.org/drawingml/2006/compatibility" xmlns:pvml="urn:schemas-microsoft-com:office:powerpoint" xmlns:v="urn:schemas-microsoft-com:vml" xmlns:o="urn:schemas-microsoft-com:office:office" xmlns:dgm="http://schemas.openxmlformats.org/drawingml/2006/diagram" xmlns:c="http://schemas.openxmlformats.org/drawingml/2006/chart" xmlns:mv="urn:schemas-microsoft-com:mac:vml" xmlns="">
       <p:transition spd="med">
         <p:fade/>
       </p:transition>
@@ -10762,7 +10762,7 @@
         <p14:reveal/>
       </p:transition>
     </mc:Choice>
-    <mc:Fallback xmlns:ahyp="http://schemas.microsoft.com/office/drawing/2018/hyperlinkcolor" xmlns:p15="http://schemas.microsoft.com/office/powerpoint/2012/main" xmlns:com="http://schemas.openxmlformats.org/drawingml/2006/compatibility" xmlns:pvml="urn:schemas-microsoft-com:office:powerpoint" xmlns:v="urn:schemas-microsoft-com:vml" xmlns:o="urn:schemas-microsoft-com:office:office" xmlns:dgm="http://schemas.openxmlformats.org/drawingml/2006/diagram" xmlns:c="http://schemas.openxmlformats.org/drawingml/2006/chart" xmlns:mv="urn:schemas-microsoft-com:mac:vml" xmlns="">
+    <mc:Fallback xmlns="" xmlns:mv="urn:schemas-microsoft-com:mac:vml" xmlns:c="http://schemas.openxmlformats.org/drawingml/2006/chart" xmlns:dgm="http://schemas.openxmlformats.org/drawingml/2006/diagram" xmlns:o="urn:schemas-microsoft-com:office:office" xmlns:v="urn:schemas-microsoft-com:vml" xmlns:pvml="urn:schemas-microsoft-com:office:powerpoint" xmlns:com="http://schemas.openxmlformats.org/drawingml/2006/compatibility" xmlns:p15="http://schemas.microsoft.com/office/powerpoint/2012/main" xmlns:ahyp="http://schemas.microsoft.com/office/drawing/2018/hyperlinkcolor">
       <p:transition spd="med">
         <p:fade/>
       </p:transition>
@@ -13484,8 +13484,8 @@
         </p:nvSpPr>
         <p:spPr>
           <a:xfrm>
-            <a:off x="431988" y="3933825"/>
-            <a:ext cx="1937646" cy="523220"/>
+            <a:off x="431988" y="3710805"/>
+            <a:ext cx="1937646" cy="1384995"/>
           </a:xfrm>
           <a:prstGeom prst="rect">
             <a:avLst/>
@@ -13499,6 +13499,17 @@
           <a:lstStyle/>
           <a:p>
             <a:r>
+              <a:rPr lang="fr-BE" sz="2800" strike="sngStrike">
+                <a:solidFill>
+                  <a:schemeClr val="accent6">
+                    <a:lumMod val="50000"/>
+                  </a:schemeClr>
+                </a:solidFill>
+                <a:latin typeface="Consolas" panose="020B0609020204030204" pitchFamily="49" charset="0"/>
+              </a:rPr>
+              <a:t>$.ajax()</a:t>
+            </a:r>
+            <a:br>
               <a:rPr lang="fr-BE" sz="2800">
                 <a:solidFill>
                   <a:schemeClr val="accent6">
@@ -13507,8 +13518,28 @@
                 </a:solidFill>
                 <a:latin typeface="Consolas" panose="020B0609020204030204" pitchFamily="49" charset="0"/>
               </a:rPr>
-              <a:t>$.ajax()</a:t>
-            </a:r>
+            </a:br>
+            <a:r>
+              <a:rPr lang="fr-BE" sz="2800">
+                <a:solidFill>
+                  <a:schemeClr val="accent6">
+                    <a:lumMod val="50000"/>
+                  </a:schemeClr>
+                </a:solidFill>
+                <a:latin typeface="Consolas" panose="020B0609020204030204" pitchFamily="49" charset="0"/>
+              </a:rPr>
+              <a:t>fetch()</a:t>
+            </a:r>
+          </a:p>
+          <a:p>
+            <a:endParaRPr lang="fr-BE" sz="2800">
+              <a:solidFill>
+                <a:schemeClr val="accent6">
+                  <a:lumMod val="50000"/>
+                </a:schemeClr>
+              </a:solidFill>
+              <a:latin typeface="Consolas" panose="020B0609020204030204" pitchFamily="49" charset="0"/>
+            </a:endParaRPr>
           </a:p>
         </p:txBody>
       </p:sp>

</xml_diff>

<commit_message>
2026/02/23 : - update chap 13, 22, 25, 27 - add AWebWiz framework with Fetch
</commit_message>
<xml_diff>
--- a/syllabus/13_formulaire_HTML/syllabus_13_form.pptx
+++ b/syllabus/13_formulaire_HTML/syllabus_13_form.pptx
@@ -5,7 +5,7 @@
     <p:sldMasterId id="2147483856" r:id="rId1"/>
   </p:sldMasterIdLst>
   <p:notesMasterIdLst>
-    <p:notesMasterId r:id="rId30"/>
+    <p:notesMasterId r:id="rId28"/>
   </p:notesMasterIdLst>
   <p:sldIdLst>
     <p:sldId id="416" r:id="rId2"/>
@@ -13,29 +13,27 @@
     <p:sldId id="352" r:id="rId4"/>
     <p:sldId id="606" r:id="rId5"/>
     <p:sldId id="647" r:id="rId6"/>
-    <p:sldId id="646" r:id="rId7"/>
-    <p:sldId id="353" r:id="rId8"/>
-    <p:sldId id="354" r:id="rId9"/>
-    <p:sldId id="355" r:id="rId10"/>
-    <p:sldId id="356" r:id="rId11"/>
-    <p:sldId id="605" r:id="rId12"/>
-    <p:sldId id="357" r:id="rId13"/>
-    <p:sldId id="358" r:id="rId14"/>
-    <p:sldId id="359" r:id="rId15"/>
-    <p:sldId id="360" r:id="rId16"/>
-    <p:sldId id="361" r:id="rId17"/>
-    <p:sldId id="362" r:id="rId18"/>
-    <p:sldId id="363" r:id="rId19"/>
-    <p:sldId id="644" r:id="rId20"/>
-    <p:sldId id="364" r:id="rId21"/>
-    <p:sldId id="643" r:id="rId22"/>
-    <p:sldId id="365" r:id="rId23"/>
-    <p:sldId id="366" r:id="rId24"/>
-    <p:sldId id="367" r:id="rId25"/>
-    <p:sldId id="517" r:id="rId26"/>
-    <p:sldId id="638" r:id="rId27"/>
-    <p:sldId id="448" r:id="rId28"/>
-    <p:sldId id="645" r:id="rId29"/>
+    <p:sldId id="353" r:id="rId7"/>
+    <p:sldId id="354" r:id="rId8"/>
+    <p:sldId id="356" r:id="rId9"/>
+    <p:sldId id="605" r:id="rId10"/>
+    <p:sldId id="357" r:id="rId11"/>
+    <p:sldId id="358" r:id="rId12"/>
+    <p:sldId id="359" r:id="rId13"/>
+    <p:sldId id="360" r:id="rId14"/>
+    <p:sldId id="361" r:id="rId15"/>
+    <p:sldId id="362" r:id="rId16"/>
+    <p:sldId id="363" r:id="rId17"/>
+    <p:sldId id="644" r:id="rId18"/>
+    <p:sldId id="364" r:id="rId19"/>
+    <p:sldId id="643" r:id="rId20"/>
+    <p:sldId id="365" r:id="rId21"/>
+    <p:sldId id="366" r:id="rId22"/>
+    <p:sldId id="367" r:id="rId23"/>
+    <p:sldId id="517" r:id="rId24"/>
+    <p:sldId id="638" r:id="rId25"/>
+    <p:sldId id="448" r:id="rId26"/>
+    <p:sldId id="645" r:id="rId27"/>
   </p:sldIdLst>
   <p:sldSz cx="12192000" cy="6858000"/>
   <p:notesSz cx="6858000" cy="9144000"/>
@@ -149,10 +147,8 @@
             <p14:sldId id="352"/>
             <p14:sldId id="606"/>
             <p14:sldId id="647"/>
-            <p14:sldId id="646"/>
             <p14:sldId id="353"/>
             <p14:sldId id="354"/>
-            <p14:sldId id="355"/>
             <p14:sldId id="356"/>
             <p14:sldId id="605"/>
             <p14:sldId id="357"/>
@@ -302,7 +298,7 @@
           <a:p>
             <a:fld id="{FCE9742F-4DAE-47F5-9244-6ACC3985DD6B}" type="datetimeFigureOut">
               <a:rPr lang="fr-BE" smtClean="0"/>
-              <a:t>24-11-25</a:t>
+              <a:t>23-02-26</a:t>
             </a:fld>
             <a:endParaRPr lang="fr-BE"/>
           </a:p>
@@ -831,7 +827,7 @@
   <p:cSld>
     <p:spTree>
       <p:nvGrpSpPr>
-        <p:cNvPr id="1" name="Shape 79"/>
+        <p:cNvPr id="1" name="Shape 86"/>
         <p:cNvGrpSpPr/>
         <p:nvPr/>
       </p:nvGrpSpPr>
@@ -845,7 +841,7 @@
       </p:grpSpPr>
       <p:sp>
         <p:nvSpPr>
-          <p:cNvPr id="80" name="Google Shape;80;gae4b1ffd_045:notes"/>
+          <p:cNvPr id="87" name="Google Shape;87;gae4b1ffd_050:notes"/>
           <p:cNvSpPr>
             <a:spLocks noGrp="1" noRot="1" noChangeAspect="1"/>
           </p:cNvSpPr>
@@ -886,7 +882,7 @@
       </p:sp>
       <p:sp>
         <p:nvSpPr>
-          <p:cNvPr id="81" name="Google Shape;81;gae4b1ffd_045:notes"/>
+          <p:cNvPr id="88" name="Google Shape;88;gae4b1ffd_050:notes"/>
           <p:cNvSpPr txBox="1">
             <a:spLocks noGrp="1"/>
           </p:cNvSpPr>
@@ -925,7 +921,7 @@
     </p:spTree>
     <p:extLst>
       <p:ext uri="{BB962C8B-B14F-4D97-AF65-F5344CB8AC3E}">
-        <p14:creationId xmlns:p14="http://schemas.microsoft.com/office/powerpoint/2010/main" val="3164590478"/>
+        <p14:creationId xmlns:p14="http://schemas.microsoft.com/office/powerpoint/2010/main" val="3923803130"/>
       </p:ext>
     </p:extLst>
   </p:cSld>
@@ -940,7 +936,7 @@
   <p:cSld>
     <p:spTree>
       <p:nvGrpSpPr>
-        <p:cNvPr id="1" name="Shape 86"/>
+        <p:cNvPr id="1" name="Shape 93"/>
         <p:cNvGrpSpPr/>
         <p:nvPr/>
       </p:nvGrpSpPr>
@@ -954,7 +950,7 @@
       </p:grpSpPr>
       <p:sp>
         <p:nvSpPr>
-          <p:cNvPr id="87" name="Google Shape;87;gae4b1ffd_050:notes"/>
+          <p:cNvPr id="94" name="Google Shape;94;gaf1ccaf6_026:notes"/>
           <p:cNvSpPr>
             <a:spLocks noGrp="1" noRot="1" noChangeAspect="1"/>
           </p:cNvSpPr>
@@ -995,7 +991,7 @@
       </p:sp>
       <p:sp>
         <p:nvSpPr>
-          <p:cNvPr id="88" name="Google Shape;88;gae4b1ffd_050:notes"/>
+          <p:cNvPr id="95" name="Google Shape;95;gaf1ccaf6_026:notes"/>
           <p:cNvSpPr txBox="1">
             <a:spLocks noGrp="1"/>
           </p:cNvSpPr>
@@ -1034,7 +1030,7 @@
     </p:spTree>
     <p:extLst>
       <p:ext uri="{BB962C8B-B14F-4D97-AF65-F5344CB8AC3E}">
-        <p14:creationId xmlns:p14="http://schemas.microsoft.com/office/powerpoint/2010/main" val="3923803130"/>
+        <p14:creationId xmlns:p14="http://schemas.microsoft.com/office/powerpoint/2010/main" val="3790451753"/>
       </p:ext>
     </p:extLst>
   </p:cSld>
@@ -1049,7 +1045,7 @@
   <p:cSld>
     <p:spTree>
       <p:nvGrpSpPr>
-        <p:cNvPr id="1" name="Shape 93"/>
+        <p:cNvPr id="1" name="Shape 99"/>
         <p:cNvGrpSpPr/>
         <p:nvPr/>
       </p:nvGrpSpPr>
@@ -1063,7 +1059,7 @@
       </p:grpSpPr>
       <p:sp>
         <p:nvSpPr>
-          <p:cNvPr id="94" name="Google Shape;94;gaf1ccaf6_026:notes"/>
+          <p:cNvPr id="100" name="Google Shape;100;gae4b1ffd_055:notes"/>
           <p:cNvSpPr>
             <a:spLocks noGrp="1" noRot="1" noChangeAspect="1"/>
           </p:cNvSpPr>
@@ -1104,7 +1100,7 @@
       </p:sp>
       <p:sp>
         <p:nvSpPr>
-          <p:cNvPr id="95" name="Google Shape;95;gaf1ccaf6_026:notes"/>
+          <p:cNvPr id="101" name="Google Shape;101;gae4b1ffd_055:notes"/>
           <p:cNvSpPr txBox="1">
             <a:spLocks noGrp="1"/>
           </p:cNvSpPr>
@@ -1143,7 +1139,7 @@
     </p:spTree>
     <p:extLst>
       <p:ext uri="{BB962C8B-B14F-4D97-AF65-F5344CB8AC3E}">
-        <p14:creationId xmlns:p14="http://schemas.microsoft.com/office/powerpoint/2010/main" val="3790451753"/>
+        <p14:creationId xmlns:p14="http://schemas.microsoft.com/office/powerpoint/2010/main" val="1871165286"/>
       </p:ext>
     </p:extLst>
   </p:cSld>
@@ -1158,7 +1154,7 @@
   <p:cSld>
     <p:spTree>
       <p:nvGrpSpPr>
-        <p:cNvPr id="1" name="Shape 99"/>
+        <p:cNvPr id="1" name="Shape 106"/>
         <p:cNvGrpSpPr/>
         <p:nvPr/>
       </p:nvGrpSpPr>
@@ -1172,7 +1168,7 @@
       </p:grpSpPr>
       <p:sp>
         <p:nvSpPr>
-          <p:cNvPr id="100" name="Google Shape;100;gae4b1ffd_055:notes"/>
+          <p:cNvPr id="107" name="Google Shape;107;g7b4200d84_08:notes"/>
           <p:cNvSpPr>
             <a:spLocks noGrp="1" noRot="1" noChangeAspect="1"/>
           </p:cNvSpPr>
@@ -1213,7 +1209,7 @@
       </p:sp>
       <p:sp>
         <p:nvSpPr>
-          <p:cNvPr id="101" name="Google Shape;101;gae4b1ffd_055:notes"/>
+          <p:cNvPr id="108" name="Google Shape;108;g7b4200d84_08:notes"/>
           <p:cNvSpPr txBox="1">
             <a:spLocks noGrp="1"/>
           </p:cNvSpPr>
@@ -1252,7 +1248,7 @@
     </p:spTree>
     <p:extLst>
       <p:ext uri="{BB962C8B-B14F-4D97-AF65-F5344CB8AC3E}">
-        <p14:creationId xmlns:p14="http://schemas.microsoft.com/office/powerpoint/2010/main" val="1871165286"/>
+        <p14:creationId xmlns:p14="http://schemas.microsoft.com/office/powerpoint/2010/main" val="3620067343"/>
       </p:ext>
     </p:extLst>
   </p:cSld>
@@ -1361,7 +1357,7 @@
     </p:spTree>
     <p:extLst>
       <p:ext uri="{BB962C8B-B14F-4D97-AF65-F5344CB8AC3E}">
-        <p14:creationId xmlns:p14="http://schemas.microsoft.com/office/powerpoint/2010/main" val="3620067343"/>
+        <p14:creationId xmlns:p14="http://schemas.microsoft.com/office/powerpoint/2010/main" val="3816991675"/>
       </p:ext>
     </p:extLst>
   </p:cSld>
@@ -1376,7 +1372,7 @@
   <p:cSld>
     <p:spTree>
       <p:nvGrpSpPr>
-        <p:cNvPr id="1" name="Shape 106"/>
+        <p:cNvPr id="1" name="Shape 112"/>
         <p:cNvGrpSpPr/>
         <p:nvPr/>
       </p:nvGrpSpPr>
@@ -1390,7 +1386,7 @@
       </p:grpSpPr>
       <p:sp>
         <p:nvSpPr>
-          <p:cNvPr id="107" name="Google Shape;107;g7b4200d84_08:notes"/>
+          <p:cNvPr id="113" name="Google Shape;113;g7b4200d84_014:notes"/>
           <p:cNvSpPr>
             <a:spLocks noGrp="1" noRot="1" noChangeAspect="1"/>
           </p:cNvSpPr>
@@ -1431,7 +1427,7 @@
       </p:sp>
       <p:sp>
         <p:nvSpPr>
-          <p:cNvPr id="108" name="Google Shape;108;g7b4200d84_08:notes"/>
+          <p:cNvPr id="114" name="Google Shape;114;g7b4200d84_014:notes"/>
           <p:cNvSpPr txBox="1">
             <a:spLocks noGrp="1"/>
           </p:cNvSpPr>
@@ -1470,7 +1466,7 @@
     </p:spTree>
     <p:extLst>
       <p:ext uri="{BB962C8B-B14F-4D97-AF65-F5344CB8AC3E}">
-        <p14:creationId xmlns:p14="http://schemas.microsoft.com/office/powerpoint/2010/main" val="3816991675"/>
+        <p14:creationId xmlns:p14="http://schemas.microsoft.com/office/powerpoint/2010/main" val="3421644567"/>
       </p:ext>
     </p:extLst>
   </p:cSld>
@@ -1485,7 +1481,7 @@
   <p:cSld>
     <p:spTree>
       <p:nvGrpSpPr>
-        <p:cNvPr id="1" name="Shape 112"/>
+        <p:cNvPr id="1" name="Shape 118"/>
         <p:cNvGrpSpPr/>
         <p:nvPr/>
       </p:nvGrpSpPr>
@@ -1499,7 +1495,7 @@
       </p:grpSpPr>
       <p:sp>
         <p:nvSpPr>
-          <p:cNvPr id="113" name="Google Shape;113;g7b4200d84_014:notes"/>
+          <p:cNvPr id="119" name="Google Shape;119;gaf1ccaf6_00:notes"/>
           <p:cNvSpPr>
             <a:spLocks noGrp="1" noRot="1" noChangeAspect="1"/>
           </p:cNvSpPr>
@@ -1540,7 +1536,7 @@
       </p:sp>
       <p:sp>
         <p:nvSpPr>
-          <p:cNvPr id="114" name="Google Shape;114;g7b4200d84_014:notes"/>
+          <p:cNvPr id="120" name="Google Shape;120;gaf1ccaf6_00:notes"/>
           <p:cNvSpPr txBox="1">
             <a:spLocks noGrp="1"/>
           </p:cNvSpPr>
@@ -1579,7 +1575,7 @@
     </p:spTree>
     <p:extLst>
       <p:ext uri="{BB962C8B-B14F-4D97-AF65-F5344CB8AC3E}">
-        <p14:creationId xmlns:p14="http://schemas.microsoft.com/office/powerpoint/2010/main" val="3421644567"/>
+        <p14:creationId xmlns:p14="http://schemas.microsoft.com/office/powerpoint/2010/main" val="3543878149"/>
       </p:ext>
     </p:extLst>
   </p:cSld>
@@ -1594,7 +1590,7 @@
   <p:cSld>
     <p:spTree>
       <p:nvGrpSpPr>
-        <p:cNvPr id="1" name="Shape 118"/>
+        <p:cNvPr id="1" name="Shape 124"/>
         <p:cNvGrpSpPr/>
         <p:nvPr/>
       </p:nvGrpSpPr>
@@ -1608,7 +1604,7 @@
       </p:grpSpPr>
       <p:sp>
         <p:nvSpPr>
-          <p:cNvPr id="119" name="Google Shape;119;gaf1ccaf6_00:notes"/>
+          <p:cNvPr id="125" name="Google Shape;125;gaf1ccaf6_05:notes"/>
           <p:cNvSpPr>
             <a:spLocks noGrp="1" noRot="1" noChangeAspect="1"/>
           </p:cNvSpPr>
@@ -1649,7 +1645,7 @@
       </p:sp>
       <p:sp>
         <p:nvSpPr>
-          <p:cNvPr id="120" name="Google Shape;120;gaf1ccaf6_00:notes"/>
+          <p:cNvPr id="126" name="Google Shape;126;gaf1ccaf6_05:notes"/>
           <p:cNvSpPr txBox="1">
             <a:spLocks noGrp="1"/>
           </p:cNvSpPr>
@@ -1688,7 +1684,7 @@
     </p:spTree>
     <p:extLst>
       <p:ext uri="{BB962C8B-B14F-4D97-AF65-F5344CB8AC3E}">
-        <p14:creationId xmlns:p14="http://schemas.microsoft.com/office/powerpoint/2010/main" val="3543878149"/>
+        <p14:creationId xmlns:p14="http://schemas.microsoft.com/office/powerpoint/2010/main" val="1874368175"/>
       </p:ext>
     </p:extLst>
   </p:cSld>
@@ -1703,7 +1699,7 @@
   <p:cSld>
     <p:spTree>
       <p:nvGrpSpPr>
-        <p:cNvPr id="1" name="Shape 124"/>
+        <p:cNvPr id="1" name="Shape 130"/>
         <p:cNvGrpSpPr/>
         <p:nvPr/>
       </p:nvGrpSpPr>
@@ -1717,7 +1713,7 @@
       </p:grpSpPr>
       <p:sp>
         <p:nvSpPr>
-          <p:cNvPr id="125" name="Google Shape;125;gaf1ccaf6_05:notes"/>
+          <p:cNvPr id="131" name="Google Shape;131;g7b4200d84_00:notes"/>
           <p:cNvSpPr>
             <a:spLocks noGrp="1" noRot="1" noChangeAspect="1"/>
           </p:cNvSpPr>
@@ -1758,7 +1754,7 @@
       </p:sp>
       <p:sp>
         <p:nvSpPr>
-          <p:cNvPr id="126" name="Google Shape;126;gaf1ccaf6_05:notes"/>
+          <p:cNvPr id="132" name="Google Shape;132;g7b4200d84_00:notes"/>
           <p:cNvSpPr txBox="1">
             <a:spLocks noGrp="1"/>
           </p:cNvSpPr>
@@ -1797,7 +1793,7 @@
     </p:spTree>
     <p:extLst>
       <p:ext uri="{BB962C8B-B14F-4D97-AF65-F5344CB8AC3E}">
-        <p14:creationId xmlns:p14="http://schemas.microsoft.com/office/powerpoint/2010/main" val="1874368175"/>
+        <p14:creationId xmlns:p14="http://schemas.microsoft.com/office/powerpoint/2010/main" val="2546007751"/>
       </p:ext>
     </p:extLst>
   </p:cSld>
@@ -1812,7 +1808,7 @@
   <p:cSld>
     <p:spTree>
       <p:nvGrpSpPr>
-        <p:cNvPr id="1" name="Shape 130"/>
+        <p:cNvPr id="1" name="Shape 157"/>
         <p:cNvGrpSpPr/>
         <p:nvPr/>
       </p:nvGrpSpPr>
@@ -1826,7 +1822,7 @@
       </p:grpSpPr>
       <p:sp>
         <p:nvSpPr>
-          <p:cNvPr id="131" name="Google Shape;131;g7b4200d84_00:notes"/>
+          <p:cNvPr id="158" name="Google Shape;158;g128d8db6e_036:notes"/>
           <p:cNvSpPr>
             <a:spLocks noGrp="1" noRot="1" noChangeAspect="1"/>
           </p:cNvSpPr>
@@ -1867,7 +1863,7 @@
       </p:sp>
       <p:sp>
         <p:nvSpPr>
-          <p:cNvPr id="132" name="Google Shape;132;g7b4200d84_00:notes"/>
+          <p:cNvPr id="159" name="Google Shape;159;g128d8db6e_036:notes"/>
           <p:cNvSpPr txBox="1">
             <a:spLocks noGrp="1"/>
           </p:cNvSpPr>
@@ -1906,7 +1902,7 @@
     </p:spTree>
     <p:extLst>
       <p:ext uri="{BB962C8B-B14F-4D97-AF65-F5344CB8AC3E}">
-        <p14:creationId xmlns:p14="http://schemas.microsoft.com/office/powerpoint/2010/main" val="2546007751"/>
+        <p14:creationId xmlns:p14="http://schemas.microsoft.com/office/powerpoint/2010/main" val="451471079"/>
       </p:ext>
     </p:extLst>
   </p:cSld>
@@ -2020,12 +2016,12 @@
 </p:notes>
 </file>
 
-<file path=ppt/notesSlides/notesSlide20.xml><?xml version="1.0" encoding="utf-8"?>
+<file path=ppt/notesSlides/notesSlide3.xml><?xml version="1.0" encoding="utf-8"?>
 <p:notes xmlns:a="http://schemas.openxmlformats.org/drawingml/2006/main" xmlns:r="http://schemas.openxmlformats.org/officeDocument/2006/relationships" xmlns:p="http://schemas.openxmlformats.org/presentationml/2006/main" showMasterSp="0" showMasterPhAnim="0">
   <p:cSld>
     <p:spTree>
       <p:nvGrpSpPr>
-        <p:cNvPr id="1" name="Shape 157"/>
+        <p:cNvPr id="1" name="Shape 33"/>
         <p:cNvGrpSpPr/>
         <p:nvPr/>
       </p:nvGrpSpPr>
@@ -2039,7 +2035,7 @@
       </p:grpSpPr>
       <p:sp>
         <p:nvSpPr>
-          <p:cNvPr id="158" name="Google Shape;158;g128d8db6e_036:notes"/>
+          <p:cNvPr id="34" name="Google Shape;34;p:notes"/>
           <p:cNvSpPr>
             <a:spLocks noGrp="1" noRot="1" noChangeAspect="1"/>
           </p:cNvSpPr>
@@ -2080,7 +2076,7 @@
       </p:sp>
       <p:sp>
         <p:nvSpPr>
-          <p:cNvPr id="159" name="Google Shape;159;g128d8db6e_036:notes"/>
+          <p:cNvPr id="35" name="Google Shape;35;p:notes"/>
           <p:cNvSpPr txBox="1">
             <a:spLocks noGrp="1"/>
           </p:cNvSpPr>
@@ -2119,7 +2115,7 @@
     </p:spTree>
     <p:extLst>
       <p:ext uri="{BB962C8B-B14F-4D97-AF65-F5344CB8AC3E}">
-        <p14:creationId xmlns:p14="http://schemas.microsoft.com/office/powerpoint/2010/main" val="451471079"/>
+        <p14:creationId xmlns:p14="http://schemas.microsoft.com/office/powerpoint/2010/main" val="2625268767"/>
       </p:ext>
     </p:extLst>
   </p:cSld>
@@ -2129,12 +2125,12 @@
 </p:notes>
 </file>
 
-<file path=ppt/notesSlides/notesSlide3.xml><?xml version="1.0" encoding="utf-8"?>
+<file path=ppt/notesSlides/notesSlide4.xml><?xml version="1.0" encoding="utf-8"?>
 <p:notes xmlns:a="http://schemas.openxmlformats.org/drawingml/2006/main" xmlns:r="http://schemas.openxmlformats.org/officeDocument/2006/relationships" xmlns:p="http://schemas.openxmlformats.org/presentationml/2006/main" showMasterSp="0" showMasterPhAnim="0">
   <p:cSld>
     <p:spTree>
       <p:nvGrpSpPr>
-        <p:cNvPr id="1" name="Shape 33"/>
+        <p:cNvPr id="1" name="Shape 40"/>
         <p:cNvGrpSpPr/>
         <p:nvPr/>
       </p:nvGrpSpPr>
@@ -2148,7 +2144,7 @@
       </p:grpSpPr>
       <p:sp>
         <p:nvSpPr>
-          <p:cNvPr id="34" name="Google Shape;34;p:notes"/>
+          <p:cNvPr id="41" name="Google Shape;41;gae4b1ffd_00:notes"/>
           <p:cNvSpPr>
             <a:spLocks noGrp="1" noRot="1" noChangeAspect="1"/>
           </p:cNvSpPr>
@@ -2189,7 +2185,7 @@
       </p:sp>
       <p:sp>
         <p:nvSpPr>
-          <p:cNvPr id="35" name="Google Shape;35;p:notes"/>
+          <p:cNvPr id="42" name="Google Shape;42;gae4b1ffd_00:notes"/>
           <p:cNvSpPr txBox="1">
             <a:spLocks noGrp="1"/>
           </p:cNvSpPr>
@@ -2228,7 +2224,7 @@
     </p:spTree>
     <p:extLst>
       <p:ext uri="{BB962C8B-B14F-4D97-AF65-F5344CB8AC3E}">
-        <p14:creationId xmlns:p14="http://schemas.microsoft.com/office/powerpoint/2010/main" val="2625268767"/>
+        <p14:creationId xmlns:p14="http://schemas.microsoft.com/office/powerpoint/2010/main" val="2600299914"/>
       </p:ext>
     </p:extLst>
   </p:cSld>
@@ -2238,12 +2234,12 @@
 </p:notes>
 </file>
 
-<file path=ppt/notesSlides/notesSlide4.xml><?xml version="1.0" encoding="utf-8"?>
+<file path=ppt/notesSlides/notesSlide5.xml><?xml version="1.0" encoding="utf-8"?>
 <p:notes xmlns:a="http://schemas.openxmlformats.org/drawingml/2006/main" xmlns:r="http://schemas.openxmlformats.org/officeDocument/2006/relationships" xmlns:p="http://schemas.openxmlformats.org/presentationml/2006/main" showMasterSp="0" showMasterPhAnim="0">
   <p:cSld>
     <p:spTree>
       <p:nvGrpSpPr>
-        <p:cNvPr id="1" name="Shape 40"/>
+        <p:cNvPr id="1" name="Shape 46"/>
         <p:cNvGrpSpPr/>
         <p:nvPr/>
       </p:nvGrpSpPr>
@@ -2257,7 +2253,7 @@
       </p:grpSpPr>
       <p:sp>
         <p:nvSpPr>
-          <p:cNvPr id="41" name="Google Shape;41;gae4b1ffd_00:notes"/>
+          <p:cNvPr id="47" name="Google Shape;47;gae4b1ffd_05:notes"/>
           <p:cNvSpPr>
             <a:spLocks noGrp="1" noRot="1" noChangeAspect="1"/>
           </p:cNvSpPr>
@@ -2298,7 +2294,7 @@
       </p:sp>
       <p:sp>
         <p:nvSpPr>
-          <p:cNvPr id="42" name="Google Shape;42;gae4b1ffd_00:notes"/>
+          <p:cNvPr id="48" name="Google Shape;48;gae4b1ffd_05:notes"/>
           <p:cNvSpPr txBox="1">
             <a:spLocks noGrp="1"/>
           </p:cNvSpPr>
@@ -2337,7 +2333,7 @@
     </p:spTree>
     <p:extLst>
       <p:ext uri="{BB962C8B-B14F-4D97-AF65-F5344CB8AC3E}">
-        <p14:creationId xmlns:p14="http://schemas.microsoft.com/office/powerpoint/2010/main" val="2600299914"/>
+        <p14:creationId xmlns:p14="http://schemas.microsoft.com/office/powerpoint/2010/main" val="3381530667"/>
       </p:ext>
     </p:extLst>
   </p:cSld>
@@ -2347,12 +2343,12 @@
 </p:notes>
 </file>
 
-<file path=ppt/notesSlides/notesSlide5.xml><?xml version="1.0" encoding="utf-8"?>
+<file path=ppt/notesSlides/notesSlide6.xml><?xml version="1.0" encoding="utf-8"?>
 <p:notes xmlns:a="http://schemas.openxmlformats.org/drawingml/2006/main" xmlns:r="http://schemas.openxmlformats.org/officeDocument/2006/relationships" xmlns:p="http://schemas.openxmlformats.org/presentationml/2006/main" showMasterSp="0" showMasterPhAnim="0">
   <p:cSld>
     <p:spTree>
       <p:nvGrpSpPr>
-        <p:cNvPr id="1" name="Shape 46"/>
+        <p:cNvPr id="1" name="Shape 58"/>
         <p:cNvGrpSpPr/>
         <p:nvPr/>
       </p:nvGrpSpPr>
@@ -2366,7 +2362,7 @@
       </p:grpSpPr>
       <p:sp>
         <p:nvSpPr>
-          <p:cNvPr id="47" name="Google Shape;47;gae4b1ffd_05:notes"/>
+          <p:cNvPr id="59" name="Google Shape;59;gaf1ccaf6_015:notes"/>
           <p:cNvSpPr>
             <a:spLocks noGrp="1" noRot="1" noChangeAspect="1"/>
           </p:cNvSpPr>
@@ -2407,7 +2403,7 @@
       </p:sp>
       <p:sp>
         <p:nvSpPr>
-          <p:cNvPr id="48" name="Google Shape;48;gae4b1ffd_05:notes"/>
+          <p:cNvPr id="60" name="Google Shape;60;gaf1ccaf6_015:notes"/>
           <p:cNvSpPr txBox="1">
             <a:spLocks noGrp="1"/>
           </p:cNvSpPr>
@@ -2446,7 +2442,7 @@
     </p:spTree>
     <p:extLst>
       <p:ext uri="{BB962C8B-B14F-4D97-AF65-F5344CB8AC3E}">
-        <p14:creationId xmlns:p14="http://schemas.microsoft.com/office/powerpoint/2010/main" val="3381530667"/>
+        <p14:creationId xmlns:p14="http://schemas.microsoft.com/office/powerpoint/2010/main" val="2026851449"/>
       </p:ext>
     </p:extLst>
   </p:cSld>
@@ -2456,12 +2452,12 @@
 </p:notes>
 </file>
 
-<file path=ppt/notesSlides/notesSlide6.xml><?xml version="1.0" encoding="utf-8"?>
+<file path=ppt/notesSlides/notesSlide7.xml><?xml version="1.0" encoding="utf-8"?>
 <p:notes xmlns:a="http://schemas.openxmlformats.org/drawingml/2006/main" xmlns:r="http://schemas.openxmlformats.org/officeDocument/2006/relationships" xmlns:p="http://schemas.openxmlformats.org/presentationml/2006/main" showMasterSp="0" showMasterPhAnim="0">
   <p:cSld>
     <p:spTree>
       <p:nvGrpSpPr>
-        <p:cNvPr id="1" name="Shape 52"/>
+        <p:cNvPr id="1" name="Shape 64"/>
         <p:cNvGrpSpPr/>
         <p:nvPr/>
       </p:nvGrpSpPr>
@@ -2475,7 +2471,7 @@
       </p:grpSpPr>
       <p:sp>
         <p:nvSpPr>
-          <p:cNvPr id="53" name="Google Shape;53;gae4b1ffd_010:notes"/>
+          <p:cNvPr id="65" name="Google Shape;65;gae4b1ffd_035:notes"/>
           <p:cNvSpPr>
             <a:spLocks noGrp="1" noRot="1" noChangeAspect="1"/>
           </p:cNvSpPr>
@@ -2516,7 +2512,7 @@
       </p:sp>
       <p:sp>
         <p:nvSpPr>
-          <p:cNvPr id="54" name="Google Shape;54;gae4b1ffd_010:notes"/>
+          <p:cNvPr id="66" name="Google Shape;66;gae4b1ffd_035:notes"/>
           <p:cNvSpPr txBox="1">
             <a:spLocks noGrp="1"/>
           </p:cNvSpPr>
@@ -2555,7 +2551,7 @@
     </p:spTree>
     <p:extLst>
       <p:ext uri="{BB962C8B-B14F-4D97-AF65-F5344CB8AC3E}">
-        <p14:creationId xmlns:p14="http://schemas.microsoft.com/office/powerpoint/2010/main" val="2152198566"/>
+        <p14:creationId xmlns:p14="http://schemas.microsoft.com/office/powerpoint/2010/main" val="4164894277"/>
       </p:ext>
     </p:extLst>
   </p:cSld>
@@ -2565,12 +2561,12 @@
 </p:notes>
 </file>
 
-<file path=ppt/notesSlides/notesSlide7.xml><?xml version="1.0" encoding="utf-8"?>
+<file path=ppt/notesSlides/notesSlide8.xml><?xml version="1.0" encoding="utf-8"?>
 <p:notes xmlns:a="http://schemas.openxmlformats.org/drawingml/2006/main" xmlns:r="http://schemas.openxmlformats.org/officeDocument/2006/relationships" xmlns:p="http://schemas.openxmlformats.org/presentationml/2006/main" showMasterSp="0" showMasterPhAnim="0">
   <p:cSld>
     <p:spTree>
       <p:nvGrpSpPr>
-        <p:cNvPr id="1" name="Shape 58"/>
+        <p:cNvPr id="1" name="Shape 70"/>
         <p:cNvGrpSpPr/>
         <p:nvPr/>
       </p:nvGrpSpPr>
@@ -2584,7 +2580,7 @@
       </p:grpSpPr>
       <p:sp>
         <p:nvSpPr>
-          <p:cNvPr id="59" name="Google Shape;59;gaf1ccaf6_015:notes"/>
+          <p:cNvPr id="71" name="Google Shape;71;gae4b1ffd_040:notes"/>
           <p:cNvSpPr>
             <a:spLocks noGrp="1" noRot="1" noChangeAspect="1"/>
           </p:cNvSpPr>
@@ -2625,7 +2621,7 @@
       </p:sp>
       <p:sp>
         <p:nvSpPr>
-          <p:cNvPr id="60" name="Google Shape;60;gaf1ccaf6_015:notes"/>
+          <p:cNvPr id="72" name="Google Shape;72;gae4b1ffd_040:notes"/>
           <p:cNvSpPr txBox="1">
             <a:spLocks noGrp="1"/>
           </p:cNvSpPr>
@@ -2664,7 +2660,7 @@
     </p:spTree>
     <p:extLst>
       <p:ext uri="{BB962C8B-B14F-4D97-AF65-F5344CB8AC3E}">
-        <p14:creationId xmlns:p14="http://schemas.microsoft.com/office/powerpoint/2010/main" val="2026851449"/>
+        <p14:creationId xmlns:p14="http://schemas.microsoft.com/office/powerpoint/2010/main" val="456761883"/>
       </p:ext>
     </p:extLst>
   </p:cSld>
@@ -2674,12 +2670,12 @@
 </p:notes>
 </file>
 
-<file path=ppt/notesSlides/notesSlide8.xml><?xml version="1.0" encoding="utf-8"?>
+<file path=ppt/notesSlides/notesSlide9.xml><?xml version="1.0" encoding="utf-8"?>
 <p:notes xmlns:a="http://schemas.openxmlformats.org/drawingml/2006/main" xmlns:r="http://schemas.openxmlformats.org/officeDocument/2006/relationships" xmlns:p="http://schemas.openxmlformats.org/presentationml/2006/main" showMasterSp="0" showMasterPhAnim="0">
   <p:cSld>
     <p:spTree>
       <p:nvGrpSpPr>
-        <p:cNvPr id="1" name="Shape 64"/>
+        <p:cNvPr id="1" name="Shape 79"/>
         <p:cNvGrpSpPr/>
         <p:nvPr/>
       </p:nvGrpSpPr>
@@ -2693,7 +2689,7 @@
       </p:grpSpPr>
       <p:sp>
         <p:nvSpPr>
-          <p:cNvPr id="65" name="Google Shape;65;gae4b1ffd_035:notes"/>
+          <p:cNvPr id="80" name="Google Shape;80;gae4b1ffd_045:notes"/>
           <p:cNvSpPr>
             <a:spLocks noGrp="1" noRot="1" noChangeAspect="1"/>
           </p:cNvSpPr>
@@ -2734,7 +2730,7 @@
       </p:sp>
       <p:sp>
         <p:nvSpPr>
-          <p:cNvPr id="66" name="Google Shape;66;gae4b1ffd_035:notes"/>
+          <p:cNvPr id="81" name="Google Shape;81;gae4b1ffd_045:notes"/>
           <p:cNvSpPr txBox="1">
             <a:spLocks noGrp="1"/>
           </p:cNvSpPr>
@@ -2773,116 +2769,7 @@
     </p:spTree>
     <p:extLst>
       <p:ext uri="{BB962C8B-B14F-4D97-AF65-F5344CB8AC3E}">
-        <p14:creationId xmlns:p14="http://schemas.microsoft.com/office/powerpoint/2010/main" val="4164894277"/>
-      </p:ext>
-    </p:extLst>
-  </p:cSld>
-  <p:clrMapOvr>
-    <a:masterClrMapping/>
-  </p:clrMapOvr>
-</p:notes>
-</file>
-
-<file path=ppt/notesSlides/notesSlide9.xml><?xml version="1.0" encoding="utf-8"?>
-<p:notes xmlns:a="http://schemas.openxmlformats.org/drawingml/2006/main" xmlns:r="http://schemas.openxmlformats.org/officeDocument/2006/relationships" xmlns:p="http://schemas.openxmlformats.org/presentationml/2006/main" showMasterSp="0" showMasterPhAnim="0">
-  <p:cSld>
-    <p:spTree>
-      <p:nvGrpSpPr>
-        <p:cNvPr id="1" name="Shape 70"/>
-        <p:cNvGrpSpPr/>
-        <p:nvPr/>
-      </p:nvGrpSpPr>
-      <p:grpSpPr>
-        <a:xfrm>
-          <a:off x="0" y="0"/>
-          <a:ext cx="0" cy="0"/>
-          <a:chOff x="0" y="0"/>
-          <a:chExt cx="0" cy="0"/>
-        </a:xfrm>
-      </p:grpSpPr>
-      <p:sp>
-        <p:nvSpPr>
-          <p:cNvPr id="71" name="Google Shape;71;gae4b1ffd_040:notes"/>
-          <p:cNvSpPr>
-            <a:spLocks noGrp="1" noRot="1" noChangeAspect="1"/>
-          </p:cNvSpPr>
-          <p:nvPr>
-            <p:ph type="sldImg" idx="2"/>
-          </p:nvPr>
-        </p:nvSpPr>
-        <p:spPr>
-          <a:xfrm>
-            <a:off x="381000" y="685800"/>
-            <a:ext cx="6096000" cy="3429000"/>
-          </a:xfrm>
-          <a:custGeom>
-            <a:avLst/>
-            <a:gdLst/>
-            <a:ahLst/>
-            <a:cxnLst/>
-            <a:rect l="l" t="t" r="r" b="b"/>
-            <a:pathLst>
-              <a:path w="120000" h="120000" extrusionOk="0">
-                <a:moveTo>
-                  <a:pt x="0" y="0"/>
-                </a:moveTo>
-                <a:lnTo>
-                  <a:pt x="120000" y="0"/>
-                </a:lnTo>
-                <a:lnTo>
-                  <a:pt x="120000" y="120000"/>
-                </a:lnTo>
-                <a:lnTo>
-                  <a:pt x="0" y="120000"/>
-                </a:lnTo>
-                <a:close/>
-              </a:path>
-            </a:pathLst>
-          </a:custGeom>
-        </p:spPr>
-      </p:sp>
-      <p:sp>
-        <p:nvSpPr>
-          <p:cNvPr id="72" name="Google Shape;72;gae4b1ffd_040:notes"/>
-          <p:cNvSpPr txBox="1">
-            <a:spLocks noGrp="1"/>
-          </p:cNvSpPr>
-          <p:nvPr>
-            <p:ph type="body" idx="1"/>
-          </p:nvPr>
-        </p:nvSpPr>
-        <p:spPr>
-          <a:xfrm>
-            <a:off x="685800" y="4343400"/>
-            <a:ext cx="5486400" cy="4114800"/>
-          </a:xfrm>
-          <a:prstGeom prst="rect">
-            <a:avLst/>
-          </a:prstGeom>
-        </p:spPr>
-        <p:txBody>
-          <a:bodyPr spcFirstLastPara="1" wrap="square" lIns="91425" tIns="91425" rIns="91425" bIns="91425" anchor="t" anchorCtr="0">
-            <a:noAutofit/>
-          </a:bodyPr>
-          <a:lstStyle/>
-          <a:p>
-            <a:pPr marL="0" lvl="0" indent="0" algn="l" rtl="0">
-              <a:spcBef>
-                <a:spcPts val="0"/>
-              </a:spcBef>
-              <a:spcAft>
-                <a:spcPts val="0"/>
-              </a:spcAft>
-              <a:buNone/>
-            </a:pPr>
-            <a:endParaRPr/>
-          </a:p>
-        </p:txBody>
-      </p:sp>
-    </p:spTree>
-    <p:extLst>
-      <p:ext uri="{BB962C8B-B14F-4D97-AF65-F5344CB8AC3E}">
-        <p14:creationId xmlns:p14="http://schemas.microsoft.com/office/powerpoint/2010/main" val="456761883"/>
+        <p14:creationId xmlns:p14="http://schemas.microsoft.com/office/powerpoint/2010/main" val="3164590478"/>
       </p:ext>
     </p:extLst>
   </p:cSld>
@@ -3045,7 +2932,7 @@
           <a:p>
             <a:fld id="{F3953782-D06E-4853-BE3C-64C197273937}" type="datetimeFigureOut">
               <a:rPr lang="fr-BE" smtClean="0"/>
-              <a:t>24-11-25</a:t>
+              <a:t>23-02-26</a:t>
             </a:fld>
             <a:endParaRPr lang="fr-BE"/>
           </a:p>
@@ -4913,7 +4800,7 @@
           <a:p>
             <a:fld id="{F3953782-D06E-4853-BE3C-64C197273937}" type="datetimeFigureOut">
               <a:rPr lang="fr-BE" smtClean="0"/>
-              <a:t>24-11-25</a:t>
+              <a:t>23-02-26</a:t>
             </a:fld>
             <a:endParaRPr lang="fr-BE"/>
           </a:p>
@@ -5229,7 +5116,7 @@
           <a:p>
             <a:fld id="{F3953782-D06E-4853-BE3C-64C197273937}" type="datetimeFigureOut">
               <a:rPr lang="fr-BE" smtClean="0"/>
-              <a:t>24-11-25</a:t>
+              <a:t>23-02-26</a:t>
             </a:fld>
             <a:endParaRPr lang="fr-BE"/>
           </a:p>
@@ -5426,7 +5313,7 @@
           <a:p>
             <a:fld id="{F3953782-D06E-4853-BE3C-64C197273937}" type="datetimeFigureOut">
               <a:rPr lang="fr-BE" smtClean="0"/>
-              <a:t>24-11-25</a:t>
+              <a:t>23-02-26</a:t>
             </a:fld>
             <a:endParaRPr lang="fr-BE"/>
           </a:p>
@@ -5688,7 +5575,7 @@
           <a:p>
             <a:fld id="{F3953782-D06E-4853-BE3C-64C197273937}" type="datetimeFigureOut">
               <a:rPr lang="fr-BE" smtClean="0"/>
-              <a:t>24-11-25</a:t>
+              <a:t>23-02-26</a:t>
             </a:fld>
             <a:endParaRPr lang="fr-BE"/>
           </a:p>
@@ -6086,7 +5973,7 @@
           <a:p>
             <a:fld id="{F3953782-D06E-4853-BE3C-64C197273937}" type="datetimeFigureOut">
               <a:rPr lang="fr-BE" smtClean="0"/>
-              <a:t>24-11-25</a:t>
+              <a:t>23-02-26</a:t>
             </a:fld>
             <a:endParaRPr lang="fr-BE"/>
           </a:p>
@@ -6234,7 +6121,7 @@
           <a:p>
             <a:fld id="{F3953782-D06E-4853-BE3C-64C197273937}" type="datetimeFigureOut">
               <a:rPr lang="fr-BE" smtClean="0"/>
-              <a:t>24-11-25</a:t>
+              <a:t>23-02-26</a:t>
             </a:fld>
             <a:endParaRPr lang="fr-BE"/>
           </a:p>
@@ -6583,7 +6470,7 @@
           <a:p>
             <a:fld id="{F3953782-D06E-4853-BE3C-64C197273937}" type="datetimeFigureOut">
               <a:rPr lang="fr-BE" smtClean="0"/>
-              <a:t>24-11-25</a:t>
+              <a:t>23-02-26</a:t>
             </a:fld>
             <a:endParaRPr lang="fr-BE"/>
           </a:p>
@@ -6909,7 +6796,7 @@
           <a:p>
             <a:fld id="{F3953782-D06E-4853-BE3C-64C197273937}" type="datetimeFigureOut">
               <a:rPr lang="fr-BE" smtClean="0"/>
-              <a:t>24-11-25</a:t>
+              <a:t>23-02-26</a:t>
             </a:fld>
             <a:endParaRPr lang="fr-BE"/>
           </a:p>
@@ -7574,295 +7461,6 @@
   <p:cSld>
     <p:spTree>
       <p:nvGrpSpPr>
-        <p:cNvPr id="1" name="Shape 61"/>
-        <p:cNvGrpSpPr/>
-        <p:nvPr/>
-      </p:nvGrpSpPr>
-      <p:grpSpPr>
-        <a:xfrm>
-          <a:off x="0" y="0"/>
-          <a:ext cx="0" cy="0"/>
-          <a:chOff x="0" y="0"/>
-          <a:chExt cx="0" cy="0"/>
-        </a:xfrm>
-      </p:grpSpPr>
-      <p:sp>
-        <p:nvSpPr>
-          <p:cNvPr id="62" name="Google Shape;62;p12"/>
-          <p:cNvSpPr txBox="1">
-            <a:spLocks noGrp="1"/>
-          </p:cNvSpPr>
-          <p:nvPr>
-            <p:ph type="title"/>
-          </p:nvPr>
-        </p:nvSpPr>
-        <p:spPr/>
-        <p:txBody>
-          <a:bodyPr/>
-          <a:lstStyle/>
-          <a:p>
-            <a:r>
-              <a:rPr lang="fr-BE">
-                <a:sym typeface="Calibri"/>
-              </a:rPr>
-              <a:t>Exemple de formulaire</a:t>
-            </a:r>
-          </a:p>
-        </p:txBody>
-      </p:sp>
-      <p:sp>
-        <p:nvSpPr>
-          <p:cNvPr id="63" name="Google Shape;63;p12"/>
-          <p:cNvSpPr txBox="1">
-            <a:spLocks noGrp="1"/>
-          </p:cNvSpPr>
-          <p:nvPr>
-            <p:ph idx="1"/>
-          </p:nvPr>
-        </p:nvSpPr>
-        <p:spPr/>
-        <p:txBody>
-          <a:bodyPr/>
-          <a:lstStyle/>
-          <a:p>
-            <a:r>
-              <a:rPr lang="fr-BE">
-                <a:sym typeface="Calibri"/>
-              </a:rPr>
-              <a:t>Déclaration d'un formulaire</a:t>
-            </a:r>
-          </a:p>
-          <a:p>
-            <a:endParaRPr lang="fr-BE">
-              <a:sym typeface="Courier New"/>
-            </a:endParaRPr>
-          </a:p>
-          <a:p>
-            <a:pPr marL="0" indent="0">
-              <a:buNone/>
-            </a:pPr>
-            <a:r>
-              <a:rPr lang="fr-BE" sz="2800" b="1">
-                <a:solidFill>
-                  <a:schemeClr val="accent6">
-                    <a:lumMod val="50000"/>
-                  </a:schemeClr>
-                </a:solidFill>
-                <a:latin typeface="Courier New" panose="02070309020205020404" pitchFamily="49" charset="0"/>
-                <a:cs typeface="Courier New" panose="02070309020205020404" pitchFamily="49" charset="0"/>
-                <a:sym typeface="Courier New"/>
-              </a:rPr>
-              <a:t>&lt;form method="get" action="./register.php"&gt;</a:t>
-            </a:r>
-          </a:p>
-          <a:p>
-            <a:pPr marL="0" indent="0">
-              <a:buNone/>
-            </a:pPr>
-            <a:r>
-              <a:rPr lang="fr-BE" sz="2800" b="1">
-                <a:solidFill>
-                  <a:schemeClr val="accent6">
-                    <a:lumMod val="50000"/>
-                  </a:schemeClr>
-                </a:solidFill>
-                <a:latin typeface="Courier New" panose="02070309020205020404" pitchFamily="49" charset="0"/>
-                <a:cs typeface="Courier New" panose="02070309020205020404" pitchFamily="49" charset="0"/>
-                <a:sym typeface="Courier New"/>
-              </a:rPr>
-              <a:t>	...</a:t>
-            </a:r>
-          </a:p>
-          <a:p>
-            <a:pPr marL="0" indent="0">
-              <a:buNone/>
-            </a:pPr>
-            <a:r>
-              <a:rPr lang="fr-BE" sz="2800" b="1">
-                <a:solidFill>
-                  <a:schemeClr val="accent6">
-                    <a:lumMod val="50000"/>
-                  </a:schemeClr>
-                </a:solidFill>
-                <a:latin typeface="Courier New" panose="02070309020205020404" pitchFamily="49" charset="0"/>
-                <a:cs typeface="Courier New" panose="02070309020205020404" pitchFamily="49" charset="0"/>
-                <a:sym typeface="Courier New"/>
-              </a:rPr>
-              <a:t>&lt;/form&gt;</a:t>
-            </a:r>
-          </a:p>
-          <a:p>
-            <a:endParaRPr lang="fr-BE"/>
-          </a:p>
-        </p:txBody>
-      </p:sp>
-    </p:spTree>
-    <p:extLst>
-      <p:ext uri="{BB962C8B-B14F-4D97-AF65-F5344CB8AC3E}">
-        <p14:creationId xmlns:p14="http://schemas.microsoft.com/office/powerpoint/2010/main" val="2573610486"/>
-      </p:ext>
-    </p:extLst>
-  </p:cSld>
-  <p:clrMapOvr>
-    <a:masterClrMapping/>
-  </p:clrMapOvr>
-  <mc:AlternateContent xmlns:mc="http://schemas.openxmlformats.org/markup-compatibility/2006" xmlns:p14="http://schemas.microsoft.com/office/powerpoint/2010/main">
-    <mc:Choice Requires="p14">
-      <p:transition spd="slow">
-        <p14:reveal/>
-      </p:transition>
-    </mc:Choice>
-    <mc:Fallback xmlns="">
-      <p:transition spd="slow">
-        <p:fade/>
-      </p:transition>
-    </mc:Fallback>
-  </mc:AlternateContent>
-</p:sld>
-</file>
-
-<file path=ppt/slides/slide11.xml><?xml version="1.0" encoding="utf-8"?>
-<p:sld xmlns:a="http://schemas.openxmlformats.org/drawingml/2006/main" xmlns:r="http://schemas.openxmlformats.org/officeDocument/2006/relationships" xmlns:p="http://schemas.openxmlformats.org/presentationml/2006/main">
-  <p:cSld>
-    <p:spTree>
-      <p:nvGrpSpPr>
-        <p:cNvPr id="1" name=""/>
-        <p:cNvGrpSpPr/>
-        <p:nvPr/>
-      </p:nvGrpSpPr>
-      <p:grpSpPr>
-        <a:xfrm>
-          <a:off x="0" y="0"/>
-          <a:ext cx="0" cy="0"/>
-          <a:chOff x="0" y="0"/>
-          <a:chExt cx="0" cy="0"/>
-        </a:xfrm>
-      </p:grpSpPr>
-      <p:sp>
-        <p:nvSpPr>
-          <p:cNvPr id="4" name="Titre 3">
-            <a:extLst>
-              <a:ext uri="{FF2B5EF4-FFF2-40B4-BE49-F238E27FC236}">
-                <a16:creationId xmlns:a16="http://schemas.microsoft.com/office/drawing/2014/main" id="{6BC2345B-F403-44E5-97C3-F5BDF024DC43}"/>
-              </a:ext>
-            </a:extLst>
-          </p:cNvPr>
-          <p:cNvSpPr>
-            <a:spLocks noGrp="1"/>
-          </p:cNvSpPr>
-          <p:nvPr>
-            <p:ph type="title"/>
-          </p:nvPr>
-        </p:nvSpPr>
-        <p:spPr/>
-        <p:txBody>
-          <a:bodyPr/>
-          <a:lstStyle/>
-          <a:p>
-            <a:r>
-              <a:rPr lang="fr-BE">
-                <a:sym typeface="Calibri"/>
-              </a:rPr>
-              <a:t>Balises HTML</a:t>
-            </a:r>
-            <a:endParaRPr lang="fr-BE"/>
-          </a:p>
-        </p:txBody>
-      </p:sp>
-      <p:sp>
-        <p:nvSpPr>
-          <p:cNvPr id="2" name="Espace réservé du texte 1">
-            <a:extLst>
-              <a:ext uri="{FF2B5EF4-FFF2-40B4-BE49-F238E27FC236}">
-                <a16:creationId xmlns:a16="http://schemas.microsoft.com/office/drawing/2014/main" id="{476AB62D-B7ED-86E3-C02B-C782347789A9}"/>
-              </a:ext>
-            </a:extLst>
-          </p:cNvPr>
-          <p:cNvSpPr>
-            <a:spLocks noGrp="1"/>
-          </p:cNvSpPr>
-          <p:nvPr>
-            <p:ph type="body" idx="1"/>
-          </p:nvPr>
-        </p:nvSpPr>
-        <p:spPr/>
-        <p:txBody>
-          <a:bodyPr/>
-          <a:lstStyle/>
-          <a:p>
-            <a:endParaRPr lang="fr-BE"/>
-          </a:p>
-        </p:txBody>
-      </p:sp>
-      <p:pic>
-        <p:nvPicPr>
-          <p:cNvPr id="6" name="Google Shape;39;p8">
-            <a:hlinkClick r:id="rId2"/>
-            <a:extLst>
-              <a:ext uri="{FF2B5EF4-FFF2-40B4-BE49-F238E27FC236}">
-                <a16:creationId xmlns:a16="http://schemas.microsoft.com/office/drawing/2014/main" id="{F73F5139-A5C5-497C-AE5C-231EBB7AE61F}"/>
-              </a:ext>
-            </a:extLst>
-          </p:cNvPr>
-          <p:cNvPicPr preferRelativeResize="0">
-            <a:picLocks noGrp="1"/>
-          </p:cNvPicPr>
-          <p:nvPr>
-            <p:ph type="pic" sz="quarter" idx="10"/>
-          </p:nvPr>
-        </p:nvPicPr>
-        <p:blipFill>
-          <a:blip r:embed="rId3" cstate="email">
-            <a:alphaModFix/>
-            <a:extLst>
-              <a:ext uri="{28A0092B-C50C-407E-A947-70E740481C1C}">
-                <a14:useLocalDpi xmlns:a14="http://schemas.microsoft.com/office/drawing/2010/main"/>
-              </a:ext>
-            </a:extLst>
-          </a:blip>
-          <a:srcRect t="37" b="37"/>
-          <a:stretch/>
-        </p:blipFill>
-        <p:spPr>
-          <a:prstGeom prst="rect">
-            <a:avLst/>
-          </a:prstGeom>
-          <a:noFill/>
-          <a:ln>
-            <a:noFill/>
-          </a:ln>
-        </p:spPr>
-      </p:pic>
-    </p:spTree>
-    <p:extLst>
-      <p:ext uri="{BB962C8B-B14F-4D97-AF65-F5344CB8AC3E}">
-        <p14:creationId xmlns:p14="http://schemas.microsoft.com/office/powerpoint/2010/main" val="3335409893"/>
-      </p:ext>
-    </p:extLst>
-  </p:cSld>
-  <p:clrMapOvr>
-    <a:masterClrMapping/>
-  </p:clrMapOvr>
-  <mc:AlternateContent xmlns:mc="http://schemas.openxmlformats.org/markup-compatibility/2006" xmlns:p14="http://schemas.microsoft.com/office/powerpoint/2010/main">
-    <mc:Choice Requires="p14">
-      <p:transition spd="slow">
-        <p14:reveal/>
-      </p:transition>
-    </mc:Choice>
-    <mc:Fallback xmlns="">
-      <p:transition spd="slow">
-        <p:fade/>
-      </p:transition>
-    </mc:Fallback>
-  </mc:AlternateContent>
-</p:sld>
-</file>
-
-<file path=ppt/slides/slide12.xml><?xml version="1.0" encoding="utf-8"?>
-<p:sld xmlns:a="http://schemas.openxmlformats.org/drawingml/2006/main" xmlns:r="http://schemas.openxmlformats.org/officeDocument/2006/relationships" xmlns:p="http://schemas.openxmlformats.org/presentationml/2006/main">
-  <p:cSld>
-    <p:spTree>
-      <p:nvGrpSpPr>
         <p:cNvPr id="1" name="Shape 67"/>
         <p:cNvGrpSpPr/>
         <p:nvPr/>
@@ -8040,7 +7638,7 @@
 </p:sld>
 </file>
 
-<file path=ppt/slides/slide13.xml><?xml version="1.0" encoding="utf-8"?>
+<file path=ppt/slides/slide11.xml><?xml version="1.0" encoding="utf-8"?>
 <p:sld xmlns:a="http://schemas.openxmlformats.org/drawingml/2006/main" xmlns:r="http://schemas.openxmlformats.org/officeDocument/2006/relationships" xmlns:p="http://schemas.openxmlformats.org/presentationml/2006/main">
   <p:cSld>
     <p:spTree>
@@ -8394,7 +7992,7 @@
 </p:sld>
 </file>
 
-<file path=ppt/slides/slide14.xml><?xml version="1.0" encoding="utf-8"?>
+<file path=ppt/slides/slide12.xml><?xml version="1.0" encoding="utf-8"?>
 <p:sld xmlns:a="http://schemas.openxmlformats.org/drawingml/2006/main" xmlns:r="http://schemas.openxmlformats.org/officeDocument/2006/relationships" xmlns:p="http://schemas.openxmlformats.org/presentationml/2006/main">
   <p:cSld>
     <p:spTree>
@@ -8789,7 +8387,7 @@
 </p:sld>
 </file>
 
-<file path=ppt/slides/slide15.xml><?xml version="1.0" encoding="utf-8"?>
+<file path=ppt/slides/slide13.xml><?xml version="1.0" encoding="utf-8"?>
 <p:sld xmlns:a="http://schemas.openxmlformats.org/drawingml/2006/main" xmlns:r="http://schemas.openxmlformats.org/officeDocument/2006/relationships" xmlns:p="http://schemas.openxmlformats.org/presentationml/2006/main">
   <p:cSld>
     <p:spTree>
@@ -9167,7 +8765,7 @@
 </p:sld>
 </file>
 
-<file path=ppt/slides/slide16.xml><?xml version="1.0" encoding="utf-8"?>
+<file path=ppt/slides/slide14.xml><?xml version="1.0" encoding="utf-8"?>
 <p:sld xmlns:a="http://schemas.openxmlformats.org/drawingml/2006/main" xmlns:r="http://schemas.openxmlformats.org/officeDocument/2006/relationships" xmlns:p="http://schemas.openxmlformats.org/presentationml/2006/main">
   <p:cSld>
     <p:spTree>
@@ -9335,7 +8933,7 @@
 </p:sld>
 </file>
 
-<file path=ppt/slides/slide17.xml><?xml version="1.0" encoding="utf-8"?>
+<file path=ppt/slides/slide15.xml><?xml version="1.0" encoding="utf-8"?>
 <p:sld xmlns:a="http://schemas.openxmlformats.org/drawingml/2006/main" xmlns:r="http://schemas.openxmlformats.org/officeDocument/2006/relationships" xmlns:p="http://schemas.openxmlformats.org/presentationml/2006/main">
   <p:cSld>
     <p:spTree>
@@ -9545,7 +9143,7 @@
 </p:sld>
 </file>
 
-<file path=ppt/slides/slide18.xml><?xml version="1.0" encoding="utf-8"?>
+<file path=ppt/slides/slide16.xml><?xml version="1.0" encoding="utf-8"?>
 <p:sld xmlns:a="http://schemas.openxmlformats.org/drawingml/2006/main" xmlns:r="http://schemas.openxmlformats.org/officeDocument/2006/relationships" xmlns:p="http://schemas.openxmlformats.org/presentationml/2006/main">
   <p:cSld>
     <p:spTree>
@@ -9966,7 +9564,7 @@
 </p:sld>
 </file>
 
-<file path=ppt/slides/slide19.xml><?xml version="1.0" encoding="utf-8"?>
+<file path=ppt/slides/slide17.xml><?xml version="1.0" encoding="utf-8"?>
 <p:sld xmlns:a="http://schemas.openxmlformats.org/drawingml/2006/main" xmlns:r="http://schemas.openxmlformats.org/officeDocument/2006/relationships" xmlns:p="http://schemas.openxmlformats.org/presentationml/2006/main">
   <p:cSld>
     <p:spTree>
@@ -10371,407 +9969,7 @@
 </p:sld>
 </file>
 
-<file path=ppt/slides/slide2.xml><?xml version="1.0" encoding="utf-8"?>
-<p:sld xmlns:a="http://schemas.openxmlformats.org/drawingml/2006/main" xmlns:r="http://schemas.openxmlformats.org/officeDocument/2006/relationships" xmlns:p="http://schemas.openxmlformats.org/presentationml/2006/main">
-  <p:cSld>
-    <p:spTree>
-      <p:nvGrpSpPr>
-        <p:cNvPr id="1" name="Shape 117"/>
-        <p:cNvGrpSpPr/>
-        <p:nvPr/>
-      </p:nvGrpSpPr>
-      <p:grpSpPr>
-        <a:xfrm>
-          <a:off x="0" y="0"/>
-          <a:ext cx="0" cy="0"/>
-          <a:chOff x="0" y="0"/>
-          <a:chExt cx="0" cy="0"/>
-        </a:xfrm>
-      </p:grpSpPr>
-      <p:sp>
-        <p:nvSpPr>
-          <p:cNvPr id="118" name="Google Shape;118;p5"/>
-          <p:cNvSpPr txBox="1">
-            <a:spLocks noGrp="1"/>
-          </p:cNvSpPr>
-          <p:nvPr>
-            <p:ph type="title"/>
-          </p:nvPr>
-        </p:nvSpPr>
-        <p:spPr>
-          <a:noFill/>
-          <a:ln>
-            <a:noFill/>
-          </a:ln>
-        </p:spPr>
-        <p:txBody>
-          <a:bodyPr spcFirstLastPara="1" wrap="square" lIns="91425" tIns="45700" rIns="91425" bIns="45700" anchor="ctr" anchorCtr="0">
-            <a:normAutofit/>
-          </a:bodyPr>
-          <a:lstStyle/>
-          <a:p>
-            <a:pPr lvl="0"/>
-            <a:r>
-              <a:rPr lang="fr-BE"/>
-              <a:t>Table des matières</a:t>
-            </a:r>
-          </a:p>
-        </p:txBody>
-      </p:sp>
-      <p:sp>
-        <p:nvSpPr>
-          <p:cNvPr id="119" name="Google Shape;119;p5"/>
-          <p:cNvSpPr txBox="1">
-            <a:spLocks noGrp="1"/>
-          </p:cNvSpPr>
-          <p:nvPr>
-            <p:ph type="body" idx="1"/>
-          </p:nvPr>
-        </p:nvSpPr>
-        <p:spPr>
-          <a:noFill/>
-          <a:ln>
-            <a:noFill/>
-          </a:ln>
-        </p:spPr>
-        <p:txBody>
-          <a:bodyPr spcFirstLastPara="1" wrap="square" lIns="91425" tIns="45700" rIns="91425" bIns="45700" numCol="1" anchor="t" anchorCtr="0">
-            <a:normAutofit/>
-          </a:bodyPr>
-          <a:lstStyle/>
-          <a:p>
-            <a:pPr lvl="0"/>
-            <a:r>
-              <a:rPr lang="fr-FR"/>
-              <a:t>Généralités</a:t>
-            </a:r>
-          </a:p>
-        </p:txBody>
-      </p:sp>
-      <p:sp>
-        <p:nvSpPr>
-          <p:cNvPr id="2" name="Espace réservé du texte 1">
-            <a:extLst>
-              <a:ext uri="{FF2B5EF4-FFF2-40B4-BE49-F238E27FC236}">
-                <a16:creationId xmlns:a16="http://schemas.microsoft.com/office/drawing/2014/main" id="{D1162652-D4A8-152D-F88F-9B8516AF8775}"/>
-              </a:ext>
-            </a:extLst>
-          </p:cNvPr>
-          <p:cNvSpPr>
-            <a:spLocks noGrp="1"/>
-          </p:cNvSpPr>
-          <p:nvPr>
-            <p:ph type="body" idx="2"/>
-          </p:nvPr>
-        </p:nvSpPr>
-        <p:spPr/>
-        <p:txBody>
-          <a:bodyPr>
-            <a:normAutofit/>
-          </a:bodyPr>
-          <a:lstStyle/>
-          <a:p>
-            <a:pPr marL="114300" indent="0">
-              <a:buNone/>
-            </a:pPr>
-            <a:r>
-              <a:rPr lang="fr-BE" sz="2400"/>
-              <a:t>01. Introduction au web</a:t>
-            </a:r>
-          </a:p>
-          <a:p>
-            <a:pPr marL="114300" indent="0">
-              <a:buNone/>
-            </a:pPr>
-            <a:r>
-              <a:rPr lang="fr-BE" sz="2400"/>
-              <a:t>03. Outils</a:t>
-            </a:r>
-          </a:p>
-          <a:p>
-            <a:pPr marL="114300" indent="0">
-              <a:buNone/>
-            </a:pPr>
-            <a:r>
-              <a:rPr lang="fr-BE" sz="2400"/>
-              <a:t>05. Format XML</a:t>
-            </a:r>
-          </a:p>
-          <a:p>
-            <a:pPr marL="114300" indent="0">
-              <a:buNone/>
-            </a:pPr>
-            <a:r>
-              <a:rPr lang="fr-BE" sz="2400"/>
-              <a:t>06. Format JSON</a:t>
-            </a:r>
-          </a:p>
-          <a:p>
-            <a:pPr marL="114300" indent="0">
-              <a:buNone/>
-            </a:pPr>
-            <a:endParaRPr lang="fr-BE" sz="2400"/>
-          </a:p>
-        </p:txBody>
-      </p:sp>
-      <p:sp>
-        <p:nvSpPr>
-          <p:cNvPr id="3" name="Espace réservé du texte 2">
-            <a:extLst>
-              <a:ext uri="{FF2B5EF4-FFF2-40B4-BE49-F238E27FC236}">
-                <a16:creationId xmlns:a16="http://schemas.microsoft.com/office/drawing/2014/main" id="{D06D5135-B8A1-9E24-38EE-4C72679CDE7E}"/>
-              </a:ext>
-            </a:extLst>
-          </p:cNvPr>
-          <p:cNvSpPr>
-            <a:spLocks noGrp="1"/>
-          </p:cNvSpPr>
-          <p:nvPr>
-            <p:ph type="body" idx="3"/>
-          </p:nvPr>
-        </p:nvSpPr>
-        <p:spPr/>
-        <p:txBody>
-          <a:bodyPr anchor="t"/>
-          <a:lstStyle/>
-          <a:p>
-            <a:pPr lvl="0"/>
-            <a:r>
-              <a:rPr lang="fr-FR"/>
-              <a:t>Front-End</a:t>
-            </a:r>
-          </a:p>
-        </p:txBody>
-      </p:sp>
-      <p:sp>
-        <p:nvSpPr>
-          <p:cNvPr id="4" name="Espace réservé du texte 3">
-            <a:extLst>
-              <a:ext uri="{FF2B5EF4-FFF2-40B4-BE49-F238E27FC236}">
-                <a16:creationId xmlns:a16="http://schemas.microsoft.com/office/drawing/2014/main" id="{17D87172-3FAF-5725-E789-9405D66598A7}"/>
-              </a:ext>
-            </a:extLst>
-          </p:cNvPr>
-          <p:cNvSpPr>
-            <a:spLocks noGrp="1"/>
-          </p:cNvSpPr>
-          <p:nvPr>
-            <p:ph type="body" idx="4"/>
-          </p:nvPr>
-        </p:nvSpPr>
-        <p:spPr>
-          <a:xfrm>
-            <a:off x="4105275" y="2501107"/>
-            <a:ext cx="3709587" cy="3684588"/>
-          </a:xfrm>
-        </p:spPr>
-        <p:txBody>
-          <a:bodyPr>
-            <a:normAutofit/>
-          </a:bodyPr>
-          <a:lstStyle/>
-          <a:p>
-            <a:pPr marL="114300" lvl="0" indent="0">
-              <a:buNone/>
-            </a:pPr>
-            <a:r>
-              <a:rPr lang="fr-BE" sz="2400"/>
-              <a:t>12. Structure HTML </a:t>
-            </a:r>
-          </a:p>
-          <a:p>
-            <a:pPr marL="114300" indent="0">
-              <a:buNone/>
-            </a:pPr>
-            <a:r>
-              <a:rPr lang="fr-BE" sz="2400">
-                <a:solidFill>
-                  <a:schemeClr val="accent2"/>
-                </a:solidFill>
-              </a:rPr>
-              <a:t>13. Formulaire HTML</a:t>
-            </a:r>
-          </a:p>
-          <a:p>
-            <a:pPr marL="114300" lvl="0" indent="0">
-              <a:buNone/>
-            </a:pPr>
-            <a:r>
-              <a:rPr lang="fr-BE" sz="2400"/>
-              <a:t>14. Mise en forme CSS</a:t>
-            </a:r>
-          </a:p>
-          <a:p>
-            <a:pPr marL="114300" lvl="0" indent="0">
-              <a:buNone/>
-            </a:pPr>
-            <a:r>
-              <a:rPr lang="fr-BE" sz="2400"/>
-              <a:t>15. Adaptabilité</a:t>
-            </a:r>
-          </a:p>
-          <a:p>
-            <a:pPr marL="114300" lvl="0" indent="0">
-              <a:buNone/>
-            </a:pPr>
-            <a:r>
-              <a:rPr lang="fr-BE" sz="2400"/>
-              <a:t>17. Javascript</a:t>
-            </a:r>
-          </a:p>
-          <a:p>
-            <a:pPr marL="114300" lvl="0" indent="0">
-              <a:buNone/>
-            </a:pPr>
-            <a:r>
-              <a:rPr lang="fr-BE" sz="2400"/>
-              <a:t>18. Bibliothèque jQuery</a:t>
-            </a:r>
-          </a:p>
-          <a:p>
-            <a:pPr marL="114300" lvl="0" indent="0">
-              <a:buNone/>
-            </a:pPr>
-            <a:r>
-              <a:rPr lang="fr-BE" sz="2400"/>
-              <a:t>19. Composant Vue.js</a:t>
-            </a:r>
-          </a:p>
-        </p:txBody>
-      </p:sp>
-      <p:sp>
-        <p:nvSpPr>
-          <p:cNvPr id="10" name="Espace réservé du texte 9">
-            <a:extLst>
-              <a:ext uri="{FF2B5EF4-FFF2-40B4-BE49-F238E27FC236}">
-                <a16:creationId xmlns:a16="http://schemas.microsoft.com/office/drawing/2014/main" id="{A5FC1231-1E2C-7231-4486-8114EAEE6AAF}"/>
-              </a:ext>
-            </a:extLst>
-          </p:cNvPr>
-          <p:cNvSpPr>
-            <a:spLocks noGrp="1"/>
-          </p:cNvSpPr>
-          <p:nvPr>
-            <p:ph type="body" idx="10"/>
-          </p:nvPr>
-        </p:nvSpPr>
-        <p:spPr/>
-        <p:txBody>
-          <a:bodyPr anchor="t"/>
-          <a:lstStyle/>
-          <a:p>
-            <a:r>
-              <a:rPr lang="fr-BE"/>
-              <a:t>Back-End</a:t>
-            </a:r>
-          </a:p>
-        </p:txBody>
-      </p:sp>
-      <p:sp>
-        <p:nvSpPr>
-          <p:cNvPr id="18" name="Espace réservé du texte 17">
-            <a:extLst>
-              <a:ext uri="{FF2B5EF4-FFF2-40B4-BE49-F238E27FC236}">
-                <a16:creationId xmlns:a16="http://schemas.microsoft.com/office/drawing/2014/main" id="{EDB2CC52-B967-555D-C3A7-C4B10EB02D18}"/>
-              </a:ext>
-            </a:extLst>
-          </p:cNvPr>
-          <p:cNvSpPr>
-            <a:spLocks noGrp="1"/>
-          </p:cNvSpPr>
-          <p:nvPr>
-            <p:ph type="body" idx="11"/>
-          </p:nvPr>
-        </p:nvSpPr>
-        <p:spPr/>
-        <p:txBody>
-          <a:bodyPr>
-            <a:normAutofit/>
-          </a:bodyPr>
-          <a:lstStyle/>
-          <a:p>
-            <a:pPr marL="114300" lvl="0" indent="0">
-              <a:buNone/>
-            </a:pPr>
-            <a:r>
-              <a:rPr lang="fr-BE" sz="2400"/>
-              <a:t>21. Middleware PHP</a:t>
-            </a:r>
-          </a:p>
-          <a:p>
-            <a:pPr marL="114300" indent="0">
-              <a:buNone/>
-            </a:pPr>
-            <a:r>
-              <a:rPr lang="fr-BE" sz="2400"/>
-              <a:t>22. Traitement du formulaire</a:t>
-            </a:r>
-          </a:p>
-          <a:p>
-            <a:pPr marL="114300" lvl="0" indent="0">
-              <a:buNone/>
-            </a:pPr>
-            <a:r>
-              <a:rPr lang="fr-BE" sz="2400"/>
-              <a:t>23. Architecture MVC</a:t>
-            </a:r>
-          </a:p>
-          <a:p>
-            <a:pPr marL="114300" lvl="0" indent="0">
-              <a:buNone/>
-            </a:pPr>
-            <a:r>
-              <a:rPr lang="fr-BE" sz="2400"/>
-              <a:t>24. Données SQL</a:t>
-            </a:r>
-          </a:p>
-          <a:p>
-            <a:pPr marL="114300" lvl="0" indent="0">
-              <a:buNone/>
-            </a:pPr>
-            <a:r>
-              <a:rPr lang="fr-BE" sz="2400"/>
-              <a:t>25. Données NoSQL</a:t>
-            </a:r>
-          </a:p>
-          <a:p>
-            <a:pPr marL="114300" indent="0">
-              <a:buNone/>
-            </a:pPr>
-            <a:r>
-              <a:rPr lang="fr-BE" sz="2400"/>
-              <a:t>27. Requête asynchrone</a:t>
-            </a:r>
-          </a:p>
-          <a:p>
-            <a:pPr marL="114300" indent="0">
-              <a:buNone/>
-            </a:pPr>
-            <a:endParaRPr lang="fr-BE" sz="2400"/>
-          </a:p>
-        </p:txBody>
-      </p:sp>
-    </p:spTree>
-  </p:cSld>
-  <p:clrMapOvr>
-    <a:masterClrMapping/>
-  </p:clrMapOvr>
-  <mc:AlternateContent xmlns:mc="http://schemas.openxmlformats.org/markup-compatibility/2006" xmlns:p14="http://schemas.microsoft.com/office/powerpoint/2010/main">
-    <mc:Choice Requires="p14">
-      <p:transition spd="slow">
-        <p14:reveal/>
-      </p:transition>
-    </mc:Choice>
-    <mc:Fallback xmlns="" xmlns:mv="urn:schemas-microsoft-com:mac:vml" xmlns:c="http://schemas.openxmlformats.org/drawingml/2006/chart" xmlns:dgm="http://schemas.openxmlformats.org/drawingml/2006/diagram" xmlns:o="urn:schemas-microsoft-com:office:office" xmlns:v="urn:schemas-microsoft-com:vml" xmlns:pvml="urn:schemas-microsoft-com:office:powerpoint" xmlns:com="http://schemas.openxmlformats.org/drawingml/2006/compatibility" xmlns:p15="http://schemas.microsoft.com/office/powerpoint/2012/main" xmlns:ahyp="http://schemas.microsoft.com/office/drawing/2018/hyperlinkcolor">
-      <p:transition spd="med">
-        <p:fade/>
-      </p:transition>
-    </mc:Fallback>
-  </mc:AlternateContent>
-</p:sld>
-</file>
-
-<file path=ppt/slides/slide20.xml><?xml version="1.0" encoding="utf-8"?>
+<file path=ppt/slides/slide18.xml><?xml version="1.0" encoding="utf-8"?>
 <p:sld xmlns:a="http://schemas.openxmlformats.org/drawingml/2006/main" xmlns:r="http://schemas.openxmlformats.org/officeDocument/2006/relationships" xmlns:p="http://schemas.openxmlformats.org/presentationml/2006/main">
   <p:cSld>
     <p:spTree>
@@ -11101,7 +10299,7 @@
 </p:sld>
 </file>
 
-<file path=ppt/slides/slide21.xml><?xml version="1.0" encoding="utf-8"?>
+<file path=ppt/slides/slide19.xml><?xml version="1.0" encoding="utf-8"?>
 <p:sld xmlns:a="http://schemas.openxmlformats.org/drawingml/2006/main" xmlns:r="http://schemas.openxmlformats.org/officeDocument/2006/relationships" xmlns:p="http://schemas.openxmlformats.org/presentationml/2006/main">
   <p:cSld>
     <p:spTree>
@@ -11238,7 +10436,407 @@
 </p:sld>
 </file>
 
-<file path=ppt/slides/slide22.xml><?xml version="1.0" encoding="utf-8"?>
+<file path=ppt/slides/slide2.xml><?xml version="1.0" encoding="utf-8"?>
+<p:sld xmlns:a="http://schemas.openxmlformats.org/drawingml/2006/main" xmlns:r="http://schemas.openxmlformats.org/officeDocument/2006/relationships" xmlns:p="http://schemas.openxmlformats.org/presentationml/2006/main">
+  <p:cSld>
+    <p:spTree>
+      <p:nvGrpSpPr>
+        <p:cNvPr id="1" name="Shape 117"/>
+        <p:cNvGrpSpPr/>
+        <p:nvPr/>
+      </p:nvGrpSpPr>
+      <p:grpSpPr>
+        <a:xfrm>
+          <a:off x="0" y="0"/>
+          <a:ext cx="0" cy="0"/>
+          <a:chOff x="0" y="0"/>
+          <a:chExt cx="0" cy="0"/>
+        </a:xfrm>
+      </p:grpSpPr>
+      <p:sp>
+        <p:nvSpPr>
+          <p:cNvPr id="118" name="Google Shape;118;p5"/>
+          <p:cNvSpPr txBox="1">
+            <a:spLocks noGrp="1"/>
+          </p:cNvSpPr>
+          <p:nvPr>
+            <p:ph type="title"/>
+          </p:nvPr>
+        </p:nvSpPr>
+        <p:spPr>
+          <a:noFill/>
+          <a:ln>
+            <a:noFill/>
+          </a:ln>
+        </p:spPr>
+        <p:txBody>
+          <a:bodyPr spcFirstLastPara="1" wrap="square" lIns="91425" tIns="45700" rIns="91425" bIns="45700" anchor="ctr" anchorCtr="0">
+            <a:normAutofit/>
+          </a:bodyPr>
+          <a:lstStyle/>
+          <a:p>
+            <a:pPr lvl="0"/>
+            <a:r>
+              <a:rPr lang="fr-BE"/>
+              <a:t>Table des matières</a:t>
+            </a:r>
+          </a:p>
+        </p:txBody>
+      </p:sp>
+      <p:sp>
+        <p:nvSpPr>
+          <p:cNvPr id="119" name="Google Shape;119;p5"/>
+          <p:cNvSpPr txBox="1">
+            <a:spLocks noGrp="1"/>
+          </p:cNvSpPr>
+          <p:nvPr>
+            <p:ph type="body" idx="1"/>
+          </p:nvPr>
+        </p:nvSpPr>
+        <p:spPr>
+          <a:noFill/>
+          <a:ln>
+            <a:noFill/>
+          </a:ln>
+        </p:spPr>
+        <p:txBody>
+          <a:bodyPr spcFirstLastPara="1" wrap="square" lIns="91425" tIns="45700" rIns="91425" bIns="45700" numCol="1" anchor="t" anchorCtr="0">
+            <a:normAutofit/>
+          </a:bodyPr>
+          <a:lstStyle/>
+          <a:p>
+            <a:pPr lvl="0"/>
+            <a:r>
+              <a:rPr lang="fr-FR"/>
+              <a:t>Généralités</a:t>
+            </a:r>
+          </a:p>
+        </p:txBody>
+      </p:sp>
+      <p:sp>
+        <p:nvSpPr>
+          <p:cNvPr id="2" name="Espace réservé du texte 1">
+            <a:extLst>
+              <a:ext uri="{FF2B5EF4-FFF2-40B4-BE49-F238E27FC236}">
+                <a16:creationId xmlns:a16="http://schemas.microsoft.com/office/drawing/2014/main" id="{D1162652-D4A8-152D-F88F-9B8516AF8775}"/>
+              </a:ext>
+            </a:extLst>
+          </p:cNvPr>
+          <p:cNvSpPr>
+            <a:spLocks noGrp="1"/>
+          </p:cNvSpPr>
+          <p:nvPr>
+            <p:ph type="body" idx="2"/>
+          </p:nvPr>
+        </p:nvSpPr>
+        <p:spPr/>
+        <p:txBody>
+          <a:bodyPr>
+            <a:normAutofit/>
+          </a:bodyPr>
+          <a:lstStyle/>
+          <a:p>
+            <a:pPr marL="114300" indent="0">
+              <a:buNone/>
+            </a:pPr>
+            <a:r>
+              <a:rPr lang="fr-BE" sz="2400"/>
+              <a:t>01. Introduction au web</a:t>
+            </a:r>
+          </a:p>
+          <a:p>
+            <a:pPr marL="114300" indent="0">
+              <a:buNone/>
+            </a:pPr>
+            <a:r>
+              <a:rPr lang="fr-BE" sz="2400"/>
+              <a:t>03. Outils</a:t>
+            </a:r>
+          </a:p>
+          <a:p>
+            <a:pPr marL="114300" indent="0">
+              <a:buNone/>
+            </a:pPr>
+            <a:r>
+              <a:rPr lang="fr-BE" sz="2400"/>
+              <a:t>05. Format XML</a:t>
+            </a:r>
+          </a:p>
+          <a:p>
+            <a:pPr marL="114300" indent="0">
+              <a:buNone/>
+            </a:pPr>
+            <a:r>
+              <a:rPr lang="fr-BE" sz="2400"/>
+              <a:t>06. Format JSON</a:t>
+            </a:r>
+          </a:p>
+          <a:p>
+            <a:pPr marL="114300" indent="0">
+              <a:buNone/>
+            </a:pPr>
+            <a:endParaRPr lang="fr-BE" sz="2400"/>
+          </a:p>
+        </p:txBody>
+      </p:sp>
+      <p:sp>
+        <p:nvSpPr>
+          <p:cNvPr id="3" name="Espace réservé du texte 2">
+            <a:extLst>
+              <a:ext uri="{FF2B5EF4-FFF2-40B4-BE49-F238E27FC236}">
+                <a16:creationId xmlns:a16="http://schemas.microsoft.com/office/drawing/2014/main" id="{D06D5135-B8A1-9E24-38EE-4C72679CDE7E}"/>
+              </a:ext>
+            </a:extLst>
+          </p:cNvPr>
+          <p:cNvSpPr>
+            <a:spLocks noGrp="1"/>
+          </p:cNvSpPr>
+          <p:nvPr>
+            <p:ph type="body" idx="3"/>
+          </p:nvPr>
+        </p:nvSpPr>
+        <p:spPr/>
+        <p:txBody>
+          <a:bodyPr anchor="t"/>
+          <a:lstStyle/>
+          <a:p>
+            <a:pPr lvl="0"/>
+            <a:r>
+              <a:rPr lang="fr-FR"/>
+              <a:t>Front-End</a:t>
+            </a:r>
+          </a:p>
+        </p:txBody>
+      </p:sp>
+      <p:sp>
+        <p:nvSpPr>
+          <p:cNvPr id="4" name="Espace réservé du texte 3">
+            <a:extLst>
+              <a:ext uri="{FF2B5EF4-FFF2-40B4-BE49-F238E27FC236}">
+                <a16:creationId xmlns:a16="http://schemas.microsoft.com/office/drawing/2014/main" id="{17D87172-3FAF-5725-E789-9405D66598A7}"/>
+              </a:ext>
+            </a:extLst>
+          </p:cNvPr>
+          <p:cNvSpPr>
+            <a:spLocks noGrp="1"/>
+          </p:cNvSpPr>
+          <p:nvPr>
+            <p:ph type="body" idx="4"/>
+          </p:nvPr>
+        </p:nvSpPr>
+        <p:spPr>
+          <a:xfrm>
+            <a:off x="4105275" y="2501107"/>
+            <a:ext cx="3709587" cy="3684588"/>
+          </a:xfrm>
+        </p:spPr>
+        <p:txBody>
+          <a:bodyPr>
+            <a:normAutofit/>
+          </a:bodyPr>
+          <a:lstStyle/>
+          <a:p>
+            <a:pPr marL="114300" lvl="0" indent="0">
+              <a:buNone/>
+            </a:pPr>
+            <a:r>
+              <a:rPr lang="fr-BE" sz="2400"/>
+              <a:t>12. Structure HTML </a:t>
+            </a:r>
+          </a:p>
+          <a:p>
+            <a:pPr marL="114300" indent="0">
+              <a:buNone/>
+            </a:pPr>
+            <a:r>
+              <a:rPr lang="fr-BE" sz="2400">
+                <a:solidFill>
+                  <a:schemeClr val="accent2"/>
+                </a:solidFill>
+              </a:rPr>
+              <a:t>13. Formulaire HTML</a:t>
+            </a:r>
+          </a:p>
+          <a:p>
+            <a:pPr marL="114300" lvl="0" indent="0">
+              <a:buNone/>
+            </a:pPr>
+            <a:r>
+              <a:rPr lang="fr-BE" sz="2400"/>
+              <a:t>14. Mise en forme CSS</a:t>
+            </a:r>
+          </a:p>
+          <a:p>
+            <a:pPr marL="114300" lvl="0" indent="0">
+              <a:buNone/>
+            </a:pPr>
+            <a:r>
+              <a:rPr lang="fr-BE" sz="2400"/>
+              <a:t>15. Adaptabilité</a:t>
+            </a:r>
+          </a:p>
+          <a:p>
+            <a:pPr marL="114300" lvl="0" indent="0">
+              <a:buNone/>
+            </a:pPr>
+            <a:r>
+              <a:rPr lang="fr-BE" sz="2400"/>
+              <a:t>17. Javascript</a:t>
+            </a:r>
+          </a:p>
+          <a:p>
+            <a:pPr marL="114300" lvl="0" indent="0">
+              <a:buNone/>
+            </a:pPr>
+            <a:r>
+              <a:rPr lang="fr-BE" sz="2400"/>
+              <a:t>18. Bibliothèque jQuery</a:t>
+            </a:r>
+          </a:p>
+          <a:p>
+            <a:pPr marL="114300" lvl="0" indent="0">
+              <a:buNone/>
+            </a:pPr>
+            <a:r>
+              <a:rPr lang="fr-BE" sz="2400"/>
+              <a:t>19. Composant Vue.js</a:t>
+            </a:r>
+          </a:p>
+        </p:txBody>
+      </p:sp>
+      <p:sp>
+        <p:nvSpPr>
+          <p:cNvPr id="10" name="Espace réservé du texte 9">
+            <a:extLst>
+              <a:ext uri="{FF2B5EF4-FFF2-40B4-BE49-F238E27FC236}">
+                <a16:creationId xmlns:a16="http://schemas.microsoft.com/office/drawing/2014/main" id="{A5FC1231-1E2C-7231-4486-8114EAEE6AAF}"/>
+              </a:ext>
+            </a:extLst>
+          </p:cNvPr>
+          <p:cNvSpPr>
+            <a:spLocks noGrp="1"/>
+          </p:cNvSpPr>
+          <p:nvPr>
+            <p:ph type="body" idx="10"/>
+          </p:nvPr>
+        </p:nvSpPr>
+        <p:spPr/>
+        <p:txBody>
+          <a:bodyPr anchor="t"/>
+          <a:lstStyle/>
+          <a:p>
+            <a:r>
+              <a:rPr lang="fr-BE"/>
+              <a:t>Back-End</a:t>
+            </a:r>
+          </a:p>
+        </p:txBody>
+      </p:sp>
+      <p:sp>
+        <p:nvSpPr>
+          <p:cNvPr id="18" name="Espace réservé du texte 17">
+            <a:extLst>
+              <a:ext uri="{FF2B5EF4-FFF2-40B4-BE49-F238E27FC236}">
+                <a16:creationId xmlns:a16="http://schemas.microsoft.com/office/drawing/2014/main" id="{EDB2CC52-B967-555D-C3A7-C4B10EB02D18}"/>
+              </a:ext>
+            </a:extLst>
+          </p:cNvPr>
+          <p:cNvSpPr>
+            <a:spLocks noGrp="1"/>
+          </p:cNvSpPr>
+          <p:nvPr>
+            <p:ph type="body" idx="11"/>
+          </p:nvPr>
+        </p:nvSpPr>
+        <p:spPr/>
+        <p:txBody>
+          <a:bodyPr>
+            <a:normAutofit/>
+          </a:bodyPr>
+          <a:lstStyle/>
+          <a:p>
+            <a:pPr marL="114300" lvl="0" indent="0">
+              <a:buNone/>
+            </a:pPr>
+            <a:r>
+              <a:rPr lang="fr-BE" sz="2400"/>
+              <a:t>21. Middleware PHP</a:t>
+            </a:r>
+          </a:p>
+          <a:p>
+            <a:pPr marL="114300" indent="0">
+              <a:buNone/>
+            </a:pPr>
+            <a:r>
+              <a:rPr lang="fr-BE" sz="2400"/>
+              <a:t>22. Traitement du formulaire</a:t>
+            </a:r>
+          </a:p>
+          <a:p>
+            <a:pPr marL="114300" lvl="0" indent="0">
+              <a:buNone/>
+            </a:pPr>
+            <a:r>
+              <a:rPr lang="fr-BE" sz="2400"/>
+              <a:t>23. Architecture MVC</a:t>
+            </a:r>
+          </a:p>
+          <a:p>
+            <a:pPr marL="114300" lvl="0" indent="0">
+              <a:buNone/>
+            </a:pPr>
+            <a:r>
+              <a:rPr lang="fr-BE" sz="2400"/>
+              <a:t>24. Données SQL</a:t>
+            </a:r>
+          </a:p>
+          <a:p>
+            <a:pPr marL="114300" lvl="0" indent="0">
+              <a:buNone/>
+            </a:pPr>
+            <a:r>
+              <a:rPr lang="fr-BE" sz="2400"/>
+              <a:t>25. Données NoSQL</a:t>
+            </a:r>
+          </a:p>
+          <a:p>
+            <a:pPr marL="114300" indent="0">
+              <a:buNone/>
+            </a:pPr>
+            <a:r>
+              <a:rPr lang="fr-BE" sz="2400"/>
+              <a:t>27. Requête asynchrone</a:t>
+            </a:r>
+          </a:p>
+          <a:p>
+            <a:pPr marL="114300" indent="0">
+              <a:buNone/>
+            </a:pPr>
+            <a:endParaRPr lang="fr-BE" sz="2400"/>
+          </a:p>
+        </p:txBody>
+      </p:sp>
+    </p:spTree>
+  </p:cSld>
+  <p:clrMapOvr>
+    <a:masterClrMapping/>
+  </p:clrMapOvr>
+  <mc:AlternateContent xmlns:mc="http://schemas.openxmlformats.org/markup-compatibility/2006" xmlns:p14="http://schemas.microsoft.com/office/powerpoint/2010/main">
+    <mc:Choice Requires="p14">
+      <p:transition spd="slow">
+        <p14:reveal/>
+      </p:transition>
+    </mc:Choice>
+    <mc:Fallback xmlns="" xmlns:mv="urn:schemas-microsoft-com:mac:vml" xmlns:c="http://schemas.openxmlformats.org/drawingml/2006/chart" xmlns:dgm="http://schemas.openxmlformats.org/drawingml/2006/diagram" xmlns:o="urn:schemas-microsoft-com:office:office" xmlns:v="urn:schemas-microsoft-com:vml" xmlns:pvml="urn:schemas-microsoft-com:office:powerpoint" xmlns:com="http://schemas.openxmlformats.org/drawingml/2006/compatibility" xmlns:p15="http://schemas.microsoft.com/office/powerpoint/2012/main" xmlns:ahyp="http://schemas.microsoft.com/office/drawing/2018/hyperlinkcolor">
+      <p:transition spd="med">
+        <p:fade/>
+      </p:transition>
+    </mc:Fallback>
+  </mc:AlternateContent>
+</p:sld>
+</file>
+
+<file path=ppt/slides/slide20.xml><?xml version="1.0" encoding="utf-8"?>
 <p:sld xmlns:a="http://schemas.openxmlformats.org/drawingml/2006/main" xmlns:r="http://schemas.openxmlformats.org/officeDocument/2006/relationships" xmlns:p="http://schemas.openxmlformats.org/presentationml/2006/main">
   <p:cSld>
     <p:spTree>
@@ -11494,7 +11092,7 @@
 </p:sld>
 </file>
 
-<file path=ppt/slides/slide23.xml><?xml version="1.0" encoding="utf-8"?>
+<file path=ppt/slides/slide21.xml><?xml version="1.0" encoding="utf-8"?>
 <p:sld xmlns:a="http://schemas.openxmlformats.org/drawingml/2006/main" xmlns:r="http://schemas.openxmlformats.org/officeDocument/2006/relationships" xmlns:p="http://schemas.openxmlformats.org/presentationml/2006/main">
   <p:cSld>
     <p:spTree>
@@ -11951,7 +11549,7 @@
 </p:sld>
 </file>
 
-<file path=ppt/slides/slide24.xml><?xml version="1.0" encoding="utf-8"?>
+<file path=ppt/slides/slide22.xml><?xml version="1.0" encoding="utf-8"?>
 <p:sld xmlns:a="http://schemas.openxmlformats.org/drawingml/2006/main" xmlns:r="http://schemas.openxmlformats.org/officeDocument/2006/relationships" xmlns:p="http://schemas.openxmlformats.org/presentationml/2006/main">
   <p:cSld>
     <p:spTree>
@@ -12325,7 +11923,7 @@
 </p:sld>
 </file>
 
-<file path=ppt/slides/slide25.xml><?xml version="1.0" encoding="utf-8"?>
+<file path=ppt/slides/slide23.xml><?xml version="1.0" encoding="utf-8"?>
 <p:sld xmlns:a="http://schemas.openxmlformats.org/drawingml/2006/main" xmlns:r="http://schemas.openxmlformats.org/officeDocument/2006/relationships" xmlns:p="http://schemas.openxmlformats.org/presentationml/2006/main">
   <p:cSld>
     <p:spTree>
@@ -12588,7 +12186,7 @@
 </p:sld>
 </file>
 
-<file path=ppt/slides/slide26.xml><?xml version="1.0" encoding="utf-8"?>
+<file path=ppt/slides/slide24.xml><?xml version="1.0" encoding="utf-8"?>
 <p:sld xmlns:a="http://schemas.openxmlformats.org/drawingml/2006/main" xmlns:r="http://schemas.openxmlformats.org/officeDocument/2006/relationships" xmlns:p="http://schemas.openxmlformats.org/presentationml/2006/main">
   <p:cSld>
     <p:spTree>
@@ -12737,7 +12335,7 @@
 </p:sld>
 </file>
 
-<file path=ppt/slides/slide27.xml><?xml version="1.0" encoding="utf-8"?>
+<file path=ppt/slides/slide25.xml><?xml version="1.0" encoding="utf-8"?>
 <p:sld xmlns:a="http://schemas.openxmlformats.org/drawingml/2006/main" xmlns:r="http://schemas.openxmlformats.org/officeDocument/2006/relationships" xmlns:p="http://schemas.openxmlformats.org/presentationml/2006/main">
   <p:cSld>
     <p:spTree>
@@ -12878,7 +12476,7 @@
 </p:sld>
 </file>
 
-<file path=ppt/slides/slide28.xml><?xml version="1.0" encoding="utf-8"?>
+<file path=ppt/slides/slide26.xml><?xml version="1.0" encoding="utf-8"?>
 <p:sld xmlns:a="http://schemas.openxmlformats.org/drawingml/2006/main" xmlns:r="http://schemas.openxmlformats.org/officeDocument/2006/relationships" xmlns:p="http://schemas.openxmlformats.org/presentationml/2006/main">
   <p:cSld>
     <p:spTree>
@@ -13691,7 +13289,7 @@
   <p:cSld>
     <p:spTree>
       <p:nvGrpSpPr>
-        <p:cNvPr id="1" name=""/>
+        <p:cNvPr id="1" name="Shape 43"/>
         <p:cNvGrpSpPr/>
         <p:nvPr/>
       </p:nvGrpSpPr>
@@ -13705,14 +13303,8 @@
       </p:grpSpPr>
       <p:sp>
         <p:nvSpPr>
-          <p:cNvPr id="5" name="Titre 4">
-            <a:extLst>
-              <a:ext uri="{FF2B5EF4-FFF2-40B4-BE49-F238E27FC236}">
-                <a16:creationId xmlns:a16="http://schemas.microsoft.com/office/drawing/2014/main" id="{60567DB5-40A3-D689-2A49-2F35E1661C1E}"/>
-              </a:ext>
-            </a:extLst>
-          </p:cNvPr>
-          <p:cNvSpPr>
+          <p:cNvPr id="44" name="Google Shape;44;p9"/>
+          <p:cNvSpPr txBox="1">
             <a:spLocks noGrp="1"/>
           </p:cNvSpPr>
           <p:nvPr>
@@ -13725,212 +13317,118 @@
           <a:lstStyle/>
           <a:p>
             <a:r>
-              <a:rPr lang="fr-BE"/>
-              <a:t>MPA vs SPA, use cases</a:t>
-            </a:r>
-          </a:p>
-        </p:txBody>
-      </p:sp>
-      <p:sp>
-        <p:nvSpPr>
-          <p:cNvPr id="7" name="Espace réservé du texte 6">
-            <a:extLst>
-              <a:ext uri="{FF2B5EF4-FFF2-40B4-BE49-F238E27FC236}">
-                <a16:creationId xmlns:a16="http://schemas.microsoft.com/office/drawing/2014/main" id="{037A0327-C066-39FA-3EB7-0985D48AFB6E}"/>
-              </a:ext>
-            </a:extLst>
-          </p:cNvPr>
-          <p:cNvSpPr>
+              <a:rPr lang="fr-BE">
+                <a:sym typeface="Calibri"/>
+              </a:rPr>
+              <a:t>Objectifs des formulaires</a:t>
+            </a:r>
+          </a:p>
+        </p:txBody>
+      </p:sp>
+      <p:sp>
+        <p:nvSpPr>
+          <p:cNvPr id="45" name="Google Shape;45;p9"/>
+          <p:cNvSpPr txBox="1">
             <a:spLocks noGrp="1"/>
           </p:cNvSpPr>
           <p:nvPr>
-            <p:ph type="body" idx="1"/>
+            <p:ph idx="1"/>
           </p:nvPr>
         </p:nvSpPr>
         <p:spPr/>
         <p:txBody>
           <a:bodyPr>
-            <a:normAutofit/>
+            <a:normAutofit fontScale="92500" lnSpcReduction="10000"/>
           </a:bodyPr>
           <a:lstStyle/>
           <a:p>
             <a:r>
-              <a:rPr lang="fr-BE" sz="3200">
-                <a:solidFill>
-                  <a:schemeClr val="accent2"/>
-                </a:solidFill>
-              </a:rPr>
-              <a:t>MPA</a:t>
-            </a:r>
-          </a:p>
-        </p:txBody>
-      </p:sp>
-      <p:sp>
-        <p:nvSpPr>
-          <p:cNvPr id="6" name="Espace réservé du contenu 5">
-            <a:extLst>
-              <a:ext uri="{FF2B5EF4-FFF2-40B4-BE49-F238E27FC236}">
-                <a16:creationId xmlns:a16="http://schemas.microsoft.com/office/drawing/2014/main" id="{4A1F8FF8-6C56-04E4-42D5-78D0BA8E4142}"/>
-              </a:ext>
-            </a:extLst>
-          </p:cNvPr>
-          <p:cNvSpPr>
-            <a:spLocks noGrp="1"/>
-          </p:cNvSpPr>
-          <p:nvPr>
-            <p:ph sz="half" idx="2"/>
-          </p:nvPr>
-        </p:nvSpPr>
-        <p:spPr/>
-        <p:txBody>
-          <a:bodyPr>
-            <a:normAutofit/>
-          </a:bodyPr>
-          <a:lstStyle/>
-          <a:p>
-            <a:r>
-              <a:rPr lang="fr-BE"/>
-              <a:t>app statique</a:t>
-            </a:r>
-          </a:p>
-          <a:p>
-            <a:r>
-              <a:rPr lang="fr-BE"/>
-              <a:t>services B2B</a:t>
-            </a:r>
-          </a:p>
-          <a:p>
-            <a:r>
-              <a:rPr lang="fr-BE"/>
-              <a:t>e-commerce</a:t>
-            </a:r>
-          </a:p>
-        </p:txBody>
-      </p:sp>
-      <p:sp>
-        <p:nvSpPr>
-          <p:cNvPr id="8" name="Espace réservé du texte 7">
-            <a:extLst>
-              <a:ext uri="{FF2B5EF4-FFF2-40B4-BE49-F238E27FC236}">
-                <a16:creationId xmlns:a16="http://schemas.microsoft.com/office/drawing/2014/main" id="{BC14CB71-9959-51E0-732D-43C5077BED5E}"/>
-              </a:ext>
-            </a:extLst>
-          </p:cNvPr>
-          <p:cNvSpPr>
-            <a:spLocks noGrp="1"/>
-          </p:cNvSpPr>
-          <p:nvPr>
-            <p:ph type="body" sz="quarter" idx="3"/>
-          </p:nvPr>
-        </p:nvSpPr>
-        <p:spPr/>
-        <p:txBody>
-          <a:bodyPr vert="horz" lIns="91440" tIns="45720" rIns="91440" bIns="45720" rtlCol="0" anchor="b">
-            <a:normAutofit/>
-          </a:bodyPr>
-          <a:lstStyle/>
-          <a:p>
-            <a:r>
-              <a:rPr lang="fr-BE" sz="3200">
-                <a:solidFill>
-                  <a:schemeClr val="accent2"/>
-                </a:solidFill>
-              </a:rPr>
-              <a:t>SPA</a:t>
-            </a:r>
-          </a:p>
-        </p:txBody>
-      </p:sp>
-      <p:sp>
-        <p:nvSpPr>
-          <p:cNvPr id="9" name="Espace réservé du contenu 8">
-            <a:extLst>
-              <a:ext uri="{FF2B5EF4-FFF2-40B4-BE49-F238E27FC236}">
-                <a16:creationId xmlns:a16="http://schemas.microsoft.com/office/drawing/2014/main" id="{EB175BB3-32CE-C415-3536-9E3113A203F5}"/>
-              </a:ext>
-            </a:extLst>
-          </p:cNvPr>
-          <p:cNvSpPr>
-            <a:spLocks noGrp="1"/>
-          </p:cNvSpPr>
-          <p:nvPr>
-            <p:ph sz="quarter" idx="4"/>
-          </p:nvPr>
-        </p:nvSpPr>
-        <p:spPr/>
-        <p:txBody>
-          <a:bodyPr>
-            <a:normAutofit/>
-          </a:bodyPr>
-          <a:lstStyle/>
-          <a:p>
-            <a:r>
-              <a:rPr lang="fr-BE"/>
-              <a:t>app dynamique</a:t>
-            </a:r>
-          </a:p>
-          <a:p>
-            <a:r>
-              <a:rPr lang="fr-BE"/>
-              <a:t>social networks</a:t>
-            </a:r>
-          </a:p>
-          <a:p>
-            <a:r>
-              <a:rPr lang="fr-BE"/>
-              <a:t>streaming services</a:t>
-            </a:r>
-          </a:p>
-          <a:p>
-            <a:r>
-              <a:rPr lang="fr-BE"/>
-              <a:t>real-time location services</a:t>
-            </a:r>
-          </a:p>
-        </p:txBody>
-      </p:sp>
-      <p:sp>
-        <p:nvSpPr>
-          <p:cNvPr id="10" name="ZoneTexte 9">
-            <a:extLst>
-              <a:ext uri="{FF2B5EF4-FFF2-40B4-BE49-F238E27FC236}">
-                <a16:creationId xmlns:a16="http://schemas.microsoft.com/office/drawing/2014/main" id="{12506C64-A250-8371-EEAC-00B2AADD7EEE}"/>
-              </a:ext>
-            </a:extLst>
-          </p:cNvPr>
-          <p:cNvSpPr txBox="1"/>
-          <p:nvPr/>
-        </p:nvSpPr>
-        <p:spPr>
-          <a:xfrm>
-            <a:off x="4626692" y="5666443"/>
-            <a:ext cx="3802566" cy="523220"/>
-          </a:xfrm>
-          <a:prstGeom prst="rect">
-            <a:avLst/>
-          </a:prstGeom>
-          <a:noFill/>
-        </p:spPr>
-        <p:txBody>
-          <a:bodyPr wrap="square" rtlCol="0">
-            <a:spAutoFit/>
-          </a:bodyPr>
-          <a:lstStyle/>
-          <a:p>
-            <a:r>
-              <a:rPr lang="fr-BE" sz="2800">
-                <a:hlinkClick r:id="rId2"/>
-              </a:rPr>
-              <a:t>discussion sur Reddit </a:t>
-            </a:r>
-            <a:endParaRPr lang="fr-BE" sz="2800"/>
+              <a:rPr lang="fr-BE">
+                <a:sym typeface="Courier New"/>
+              </a:rPr>
+              <a:t>Approche MPA </a:t>
+            </a:r>
+          </a:p>
+          <a:p>
+            <a:pPr lvl="1"/>
+            <a:r>
+              <a:rPr lang="fr-BE">
+                <a:sym typeface="Calibri"/>
+              </a:rPr>
+              <a:t>création d'un formulaire via la balise </a:t>
+            </a:r>
+            <a:r>
+              <a:rPr lang="fr-BE">
+                <a:solidFill>
+                  <a:srgbClr val="996633"/>
+                </a:solidFill>
+                <a:latin typeface="Consolas" panose="020B0609020204030204" pitchFamily="49" charset="0"/>
+                <a:cs typeface="Courier New" panose="02070309020205020404" pitchFamily="49" charset="0"/>
+                <a:sym typeface="Courier New"/>
+              </a:rPr>
+              <a:t>&lt;form&gt;</a:t>
+            </a:r>
+          </a:p>
+          <a:p>
+            <a:r>
+              <a:rPr lang="fr-BE">
+                <a:sym typeface="Courier New"/>
+              </a:rPr>
+              <a:t>Approche SPA</a:t>
+            </a:r>
+          </a:p>
+          <a:p>
+            <a:pPr lvl="1"/>
+            <a:r>
+              <a:rPr lang="fr-BE">
+                <a:sym typeface="Calibri"/>
+              </a:rPr>
+              <a:t>création d'un formulaire muni de requêtes AJAX/Fetch</a:t>
+            </a:r>
+            <a:endParaRPr lang="fr-BE">
+              <a:sym typeface="Courier New"/>
+            </a:endParaRPr>
+          </a:p>
+          <a:p>
+            <a:r>
+              <a:rPr lang="fr-BE">
+                <a:sym typeface="Calibri"/>
+              </a:rPr>
+              <a:t>Les formulaires sont utilisés pour récolter des informations des utilisateurs.</a:t>
+            </a:r>
+          </a:p>
+          <a:p>
+            <a:r>
+              <a:rPr lang="fr-BE">
+                <a:sym typeface="Calibri"/>
+              </a:rPr>
+              <a:t>Deux problèmes:</a:t>
+            </a:r>
+          </a:p>
+          <a:p>
+            <a:pPr lvl="1"/>
+            <a:r>
+              <a:rPr lang="fr-BE">
+                <a:sym typeface="Calibri"/>
+              </a:rPr>
+              <a:t>Comment envoyer les données au serveur ?</a:t>
+            </a:r>
+          </a:p>
+          <a:p>
+            <a:pPr lvl="1"/>
+            <a:r>
+              <a:rPr lang="fr-BE">
+                <a:sym typeface="Calibri"/>
+              </a:rPr>
+              <a:t>Comment le serveur traite-t-il les données reçues?</a:t>
+            </a:r>
           </a:p>
         </p:txBody>
       </p:sp>
     </p:spTree>
     <p:extLst>
       <p:ext uri="{BB962C8B-B14F-4D97-AF65-F5344CB8AC3E}">
-        <p14:creationId xmlns:p14="http://schemas.microsoft.com/office/powerpoint/2010/main" val="2145867279"/>
+        <p14:creationId xmlns:p14="http://schemas.microsoft.com/office/powerpoint/2010/main" val="2817179324"/>
       </p:ext>
     </p:extLst>
   </p:cSld>
@@ -13957,7 +13455,7 @@
   <p:cSld>
     <p:spTree>
       <p:nvGrpSpPr>
-        <p:cNvPr id="1" name="Shape 43"/>
+        <p:cNvPr id="1" name="Shape 49"/>
         <p:cNvGrpSpPr/>
         <p:nvPr/>
       </p:nvGrpSpPr>
@@ -13971,7 +13469,7 @@
       </p:grpSpPr>
       <p:sp>
         <p:nvSpPr>
-          <p:cNvPr id="44" name="Google Shape;44;p9"/>
+          <p:cNvPr id="50" name="Google Shape;50;p10"/>
           <p:cNvSpPr txBox="1">
             <a:spLocks noGrp="1"/>
           </p:cNvSpPr>
@@ -13988,14 +13486,14 @@
               <a:rPr lang="fr-BE">
                 <a:sym typeface="Calibri"/>
               </a:rPr>
-              <a:t>Objectifs des formulaires</a:t>
-            </a:r>
-          </a:p>
-        </p:txBody>
-      </p:sp>
-      <p:sp>
-        <p:nvSpPr>
-          <p:cNvPr id="45" name="Google Shape;45;p9"/>
+              <a:t>Comment faire transiter les données?</a:t>
+            </a:r>
+          </a:p>
+        </p:txBody>
+      </p:sp>
+      <p:sp>
+        <p:nvSpPr>
+          <p:cNvPr id="51" name="Google Shape;51;p10"/>
           <p:cNvSpPr txBox="1">
             <a:spLocks noGrp="1"/>
           </p:cNvSpPr>
@@ -14006,99 +13504,166 @@
         <p:spPr/>
         <p:txBody>
           <a:bodyPr>
-            <a:normAutofit fontScale="92500" lnSpcReduction="10000"/>
+            <a:normAutofit fontScale="92500" lnSpcReduction="20000"/>
           </a:bodyPr>
           <a:lstStyle/>
           <a:p>
             <a:r>
               <a:rPr lang="fr-BE">
-                <a:sym typeface="Courier New"/>
-              </a:rPr>
-              <a:t>Approche MPA </a:t>
+                <a:sym typeface="Calibri"/>
+              </a:rPr>
+              <a:t>Protocole, deux méthodes</a:t>
             </a:r>
           </a:p>
           <a:p>
             <a:pPr lvl="1"/>
+            <a:r>
+              <a:rPr lang="fr-BE">
+                <a:solidFill>
+                  <a:schemeClr val="accent2"/>
+                </a:solidFill>
+                <a:sym typeface="Calibri"/>
+              </a:rPr>
+              <a:t>GET</a:t>
+            </a:r>
             <a:r>
               <a:rPr lang="fr-BE">
                 <a:sym typeface="Calibri"/>
               </a:rPr>
-              <a:t>création d'un formulaire via la balise </a:t>
-            </a:r>
-            <a:r>
-              <a:rPr lang="fr-BE" b="1">
-                <a:solidFill>
-                  <a:schemeClr val="accent6">
-                    <a:lumMod val="50000"/>
-                  </a:schemeClr>
-                </a:solidFill>
-                <a:latin typeface="Courier New" panose="02070309020205020404" pitchFamily="49" charset="0"/>
-                <a:cs typeface="Courier New" panose="02070309020205020404" pitchFamily="49" charset="0"/>
-                <a:sym typeface="Courier New"/>
-              </a:rPr>
-              <a:t>&lt;form&gt;</a:t>
-            </a:r>
-          </a:p>
-          <a:p>
+              <a:t>: envoie les données dans l'URL de la page</a:t>
+            </a:r>
+          </a:p>
+          <a:p>
+            <a:pPr lvl="2"/>
             <a:r>
               <a:rPr lang="fr-BE">
                 <a:sym typeface="Courier New"/>
               </a:rPr>
-              <a:t>Approche SPA</a:t>
-            </a:r>
-          </a:p>
-          <a:p>
-            <a:pPr lvl="1"/>
+              <a:t>https://www.google.com/search ? </a:t>
+            </a:r>
+            <a:r>
+              <a:rPr lang="fr-BE">
+                <a:solidFill>
+                  <a:schemeClr val="accent2"/>
+                </a:solidFill>
+                <a:sym typeface="Courier New"/>
+              </a:rPr>
+              <a:t>q=</a:t>
+            </a:r>
+            <a:r>
+              <a:rPr lang="fr-BE" err="1">
+                <a:solidFill>
+                  <a:schemeClr val="accent2"/>
+                </a:solidFill>
+                <a:sym typeface="Courier New"/>
+              </a:rPr>
+              <a:t>developpement+photo</a:t>
+            </a:r>
+            <a:endParaRPr lang="fr-BE">
+              <a:solidFill>
+                <a:schemeClr val="accent2"/>
+              </a:solidFill>
+              <a:sym typeface="Courier New"/>
+            </a:endParaRPr>
+          </a:p>
+          <a:p>
+            <a:pPr lvl="2"/>
             <a:r>
               <a:rPr lang="fr-BE">
                 <a:sym typeface="Calibri"/>
               </a:rPr>
-              <a:t>création d'un formulaire muni de requêtes AJAX</a:t>
-            </a:r>
-            <a:endParaRPr lang="fr-BE">
-              <a:sym typeface="Courier New"/>
-            </a:endParaRPr>
-          </a:p>
-          <a:p>
+              <a:t>Limité à 255 caractères</a:t>
+            </a:r>
+          </a:p>
+          <a:p>
+            <a:pPr lvl="2"/>
             <a:r>
               <a:rPr lang="fr-BE">
                 <a:sym typeface="Calibri"/>
               </a:rPr>
-              <a:t>Les formulaires sont utilisés pour récolter des informations des utilisateurs.</a:t>
-            </a:r>
-          </a:p>
-          <a:p>
+              <a:t>Paramètres visibles</a:t>
+            </a:r>
+          </a:p>
+          <a:p>
+            <a:pPr lvl="1"/>
+            <a:r>
+              <a:rPr lang="fr-BE">
+                <a:solidFill>
+                  <a:schemeClr val="accent2"/>
+                </a:solidFill>
+                <a:sym typeface="Calibri"/>
+              </a:rPr>
+              <a:t>POST</a:t>
+            </a:r>
             <a:r>
               <a:rPr lang="fr-BE">
                 <a:sym typeface="Calibri"/>
               </a:rPr>
-              <a:t>Deux problèmes:</a:t>
-            </a:r>
-          </a:p>
-          <a:p>
-            <a:pPr lvl="1"/>
+              <a:t>: envoie les données via la requête HTTP</a:t>
+            </a:r>
+          </a:p>
+          <a:p>
+            <a:pPr lvl="2"/>
             <a:r>
               <a:rPr lang="fr-BE">
                 <a:sym typeface="Calibri"/>
               </a:rPr>
-              <a:t>Comment envoyer les données au serveur ?</a:t>
-            </a:r>
-          </a:p>
-          <a:p>
-            <a:pPr lvl="1"/>
+              <a:t>Permet de faire transiter un plus gros nombre de caractères</a:t>
+            </a:r>
+          </a:p>
+          <a:p>
+            <a:pPr lvl="2"/>
             <a:r>
               <a:rPr lang="fr-BE">
                 <a:sym typeface="Calibri"/>
               </a:rPr>
-              <a:t>Comment le serveur traite-t-il les données reçues?</a:t>
-            </a:r>
+              <a:t>Paramètres invisibles</a:t>
+            </a:r>
+          </a:p>
+          <a:p>
+            <a:r>
+              <a:rPr lang="fr-BE">
+                <a:sym typeface="Calibri"/>
+              </a:rPr>
+              <a:t>Serveur, un script</a:t>
+            </a:r>
+          </a:p>
+          <a:p>
+            <a:pPr lvl="1"/>
+            <a:r>
+              <a:rPr lang="fr-BE">
+                <a:sym typeface="Calibri"/>
+              </a:rPr>
+              <a:t>Les données du formulaire sont envoyées à un </a:t>
+            </a:r>
+            <a:r>
+              <a:rPr lang="fr-BE">
+                <a:solidFill>
+                  <a:schemeClr val="accent2"/>
+                </a:solidFill>
+                <a:sym typeface="Calibri"/>
+              </a:rPr>
+              <a:t>script</a:t>
+            </a:r>
+            <a:r>
+              <a:rPr lang="fr-BE">
+                <a:sym typeface="Calibri"/>
+              </a:rPr>
+              <a:t> (ex. PHP) qui pourra les traiter.</a:t>
+            </a:r>
+          </a:p>
+          <a:p>
+            <a:pPr lvl="1"/>
+            <a:endParaRPr lang="fr-BE">
+              <a:sym typeface="Calibri"/>
+            </a:endParaRPr>
           </a:p>
         </p:txBody>
       </p:sp>
     </p:spTree>
     <p:extLst>
       <p:ext uri="{BB962C8B-B14F-4D97-AF65-F5344CB8AC3E}">
-        <p14:creationId xmlns:p14="http://schemas.microsoft.com/office/powerpoint/2010/main" val="2817179324"/>
+        <p14:creationId xmlns:p14="http://schemas.microsoft.com/office/powerpoint/2010/main" val="1761849454"/>
       </p:ext>
     </p:extLst>
   </p:cSld>
@@ -14125,7 +13690,7 @@
   <p:cSld>
     <p:spTree>
       <p:nvGrpSpPr>
-        <p:cNvPr id="1" name="Shape 49"/>
+        <p:cNvPr id="1" name="Shape 61"/>
         <p:cNvGrpSpPr/>
         <p:nvPr/>
       </p:nvGrpSpPr>
@@ -14139,7 +13704,7 @@
       </p:grpSpPr>
       <p:sp>
         <p:nvSpPr>
-          <p:cNvPr id="50" name="Google Shape;50;p10"/>
+          <p:cNvPr id="62" name="Google Shape;62;p12"/>
           <p:cNvSpPr txBox="1">
             <a:spLocks noGrp="1"/>
           </p:cNvSpPr>
@@ -14156,14 +13721,14 @@
               <a:rPr lang="fr-BE">
                 <a:sym typeface="Calibri"/>
               </a:rPr>
-              <a:t>Comment faire transiter les données?</a:t>
-            </a:r>
-          </a:p>
-        </p:txBody>
-      </p:sp>
-      <p:sp>
-        <p:nvSpPr>
-          <p:cNvPr id="51" name="Google Shape;51;p10"/>
+              <a:t>MPA : Déclaration d'un formulaire</a:t>
+            </a:r>
+          </a:p>
+        </p:txBody>
+      </p:sp>
+      <p:sp>
+        <p:nvSpPr>
+          <p:cNvPr id="63" name="Google Shape;63;p12"/>
           <p:cNvSpPr txBox="1">
             <a:spLocks noGrp="1"/>
           </p:cNvSpPr>
@@ -14174,7 +13739,7 @@
         <p:spPr/>
         <p:txBody>
           <a:bodyPr>
-            <a:normAutofit fontScale="92500" lnSpcReduction="20000"/>
+            <a:normAutofit fontScale="85000" lnSpcReduction="20000"/>
           </a:bodyPr>
           <a:lstStyle/>
           <a:p>
@@ -14182,350 +13747,307 @@
               <a:rPr lang="fr-BE">
                 <a:sym typeface="Calibri"/>
               </a:rPr>
-              <a:t>Deux méthodes :</a:t>
-            </a:r>
-          </a:p>
-          <a:p>
-            <a:pPr lvl="1"/>
+              <a:t>Balise </a:t>
+            </a:r>
             <a:r>
               <a:rPr lang="fr-BE">
                 <a:solidFill>
-                  <a:schemeClr val="accent2"/>
-                </a:solidFill>
+                  <a:srgbClr val="996633"/>
+                </a:solidFill>
+                <a:latin typeface="Consolas" panose="020B0609020204030204" pitchFamily="49" charset="0"/>
+                <a:cs typeface="Courier New" panose="02070309020205020404" pitchFamily="49" charset="0"/>
                 <a:sym typeface="Calibri"/>
               </a:rPr>
-              <a:t>GET</a:t>
-            </a:r>
+              <a:t>&lt;form&gt;</a:t>
+            </a:r>
+            <a:endParaRPr lang="fr-BE">
+              <a:solidFill>
+                <a:srgbClr val="996633"/>
+              </a:solidFill>
+              <a:latin typeface="Consolas" panose="020B0609020204030204" pitchFamily="49" charset="0"/>
+              <a:sym typeface="Calibri"/>
+            </a:endParaRPr>
+          </a:p>
+          <a:p>
             <a:r>
               <a:rPr lang="fr-BE">
                 <a:sym typeface="Calibri"/>
               </a:rPr>
-              <a:t>: envoie les données dans l'URL de la page</a:t>
-            </a:r>
-          </a:p>
-          <a:p>
-            <a:pPr lvl="2"/>
+              <a:t>Transit défini avec l'attribut "</a:t>
+            </a:r>
             <a:r>
               <a:rPr lang="fr-BE">
-                <a:sym typeface="Courier New"/>
-              </a:rPr>
-              <a:t>https://www.google.com/search ? </a:t>
+                <a:solidFill>
+                  <a:srgbClr val="996633"/>
+                </a:solidFill>
+                <a:latin typeface="Consolas" panose="020B0609020204030204" pitchFamily="49" charset="0"/>
+                <a:cs typeface="Courier New" panose="02070309020205020404" pitchFamily="49" charset="0"/>
+                <a:sym typeface="Courier New"/>
+              </a:rPr>
+              <a:t>method</a:t>
             </a:r>
             <a:r>
               <a:rPr lang="fr-BE">
+                <a:sym typeface="Courier New"/>
+              </a:rPr>
+              <a:t>"</a:t>
+            </a:r>
+            <a:endParaRPr lang="fr-BE" b="1">
+              <a:solidFill>
+                <a:schemeClr val="accent6">
+                  <a:lumMod val="50000"/>
+                </a:schemeClr>
+              </a:solidFill>
+              <a:latin typeface="Courier New" panose="02070309020205020404" pitchFamily="49" charset="0"/>
+              <a:cs typeface="Courier New" panose="02070309020205020404" pitchFamily="49" charset="0"/>
+              <a:sym typeface="Calibri"/>
+            </a:endParaRPr>
+          </a:p>
+          <a:p>
+            <a:pPr lvl="1"/>
+            <a:r>
+              <a:rPr lang="fr-BE">
+                <a:solidFill>
+                  <a:srgbClr val="996633"/>
+                </a:solidFill>
+                <a:latin typeface="Consolas" panose="020B0609020204030204" pitchFamily="49" charset="0"/>
+                <a:sym typeface="Calibri"/>
+              </a:rPr>
+              <a:t>method = "</a:t>
+            </a:r>
+            <a:r>
+              <a:rPr lang="fr-BE">
+                <a:solidFill>
+                  <a:schemeClr val="accent5"/>
+                </a:solidFill>
+                <a:latin typeface="Consolas" panose="020B0609020204030204" pitchFamily="49" charset="0"/>
+                <a:sym typeface="Calibri"/>
+              </a:rPr>
+              <a:t>get</a:t>
+            </a:r>
+            <a:r>
+              <a:rPr lang="fr-BE">
+                <a:solidFill>
+                  <a:srgbClr val="996633"/>
+                </a:solidFill>
+                <a:latin typeface="Consolas" panose="020B0609020204030204" pitchFamily="49" charset="0"/>
+                <a:sym typeface="Calibri"/>
+              </a:rPr>
+              <a:t>"</a:t>
+            </a:r>
+            <a:r>
+              <a:rPr lang="fr-BE">
+                <a:sym typeface="Calibri"/>
+              </a:rPr>
+              <a:t> ou </a:t>
+            </a:r>
+            <a:r>
+              <a:rPr lang="fr-BE">
+                <a:solidFill>
+                  <a:srgbClr val="996633"/>
+                </a:solidFill>
+                <a:latin typeface="Consolas" panose="020B0609020204030204" pitchFamily="49" charset="0"/>
+                <a:sym typeface="Calibri"/>
+              </a:rPr>
+              <a:t>"</a:t>
+            </a:r>
+            <a:r>
+              <a:rPr lang="fr-BE">
+                <a:solidFill>
+                  <a:schemeClr val="accent5"/>
+                </a:solidFill>
+                <a:latin typeface="Consolas" panose="020B0609020204030204" pitchFamily="49" charset="0"/>
+                <a:sym typeface="Calibri"/>
+              </a:rPr>
+              <a:t>post</a:t>
+            </a:r>
+            <a:r>
+              <a:rPr lang="fr-BE">
+                <a:solidFill>
+                  <a:srgbClr val="996633"/>
+                </a:solidFill>
+                <a:latin typeface="Consolas" panose="020B0609020204030204" pitchFamily="49" charset="0"/>
+                <a:sym typeface="Calibri"/>
+              </a:rPr>
+              <a:t>"</a:t>
+            </a:r>
+          </a:p>
+          <a:p>
+            <a:r>
+              <a:rPr lang="fr-BE">
+                <a:sym typeface="Calibri"/>
+              </a:rPr>
+              <a:t>Script défini avec l'attribut "</a:t>
+            </a:r>
+            <a:r>
+              <a:rPr lang="fr-BE">
+                <a:solidFill>
+                  <a:srgbClr val="996633"/>
+                </a:solidFill>
+                <a:latin typeface="Consolas" panose="020B0609020204030204" pitchFamily="49" charset="0"/>
+                <a:sym typeface="Calibri"/>
+              </a:rPr>
+              <a:t>action</a:t>
+            </a:r>
+            <a:r>
+              <a:rPr lang="fr-BE">
+                <a:sym typeface="Calibri"/>
+              </a:rPr>
+              <a:t>"</a:t>
+            </a:r>
+          </a:p>
+          <a:p>
+            <a:pPr lvl="1"/>
+            <a:r>
+              <a:rPr lang="fr-BE">
+                <a:solidFill>
+                  <a:srgbClr val="996633"/>
+                </a:solidFill>
+                <a:latin typeface="Consolas" panose="020B0609020204030204" pitchFamily="49" charset="0"/>
+                <a:sym typeface="Calibri"/>
+              </a:rPr>
+              <a:t>action = </a:t>
+            </a:r>
+            <a:r>
+              <a:rPr lang="fr-BE">
                 <a:solidFill>
                   <a:schemeClr val="accent2"/>
                 </a:solidFill>
-                <a:sym typeface="Courier New"/>
-              </a:rPr>
-              <a:t>q=</a:t>
-            </a:r>
-            <a:r>
-              <a:rPr lang="fr-BE" err="1">
-                <a:solidFill>
-                  <a:schemeClr val="accent2"/>
-                </a:solidFill>
-                <a:sym typeface="Courier New"/>
-              </a:rPr>
-              <a:t>developpement+photo</a:t>
-            </a:r>
+                <a:latin typeface="Consolas" panose="020B0609020204030204" pitchFamily="49" charset="0"/>
+                <a:sym typeface="Calibri"/>
+              </a:rPr>
+              <a:t>&lt;path du script&gt;</a:t>
+            </a:r>
+            <a:r>
+              <a:rPr lang="fr-BE">
+                <a:sym typeface="Calibri"/>
+              </a:rPr>
+              <a:t> (php ou autre)</a:t>
+            </a:r>
+          </a:p>
+          <a:p>
+            <a:pPr lvl="1"/>
+            <a:r>
+              <a:rPr lang="fr-BE">
+                <a:sym typeface="Calibri"/>
+              </a:rPr>
+              <a:t>Rendez-vous au chapitre 22 !</a:t>
+            </a:r>
+          </a:p>
+          <a:p>
+            <a:pPr lvl="1"/>
+            <a:r>
+              <a:rPr lang="fr-BE">
+                <a:sym typeface="Calibri"/>
+              </a:rPr>
+              <a:t>Programmation en PHP (ou autre) requise </a:t>
+            </a:r>
+          </a:p>
+          <a:p>
             <a:endParaRPr lang="fr-BE">
-              <a:solidFill>
-                <a:schemeClr val="accent2"/>
-              </a:solidFill>
               <a:sym typeface="Courier New"/>
             </a:endParaRPr>
           </a:p>
           <a:p>
-            <a:pPr lvl="2"/>
-            <a:r>
-              <a:rPr lang="fr-BE">
-                <a:sym typeface="Calibri"/>
-              </a:rPr>
-              <a:t>Limité à 255 caractères</a:t>
-            </a:r>
-          </a:p>
-          <a:p>
-            <a:pPr lvl="2"/>
-            <a:r>
-              <a:rPr lang="fr-BE">
-                <a:sym typeface="Calibri"/>
-              </a:rPr>
-              <a:t>Paramètres visibles</a:t>
-            </a:r>
-          </a:p>
-          <a:p>
-            <a:pPr lvl="1"/>
-            <a:r>
-              <a:rPr lang="fr-BE">
-                <a:solidFill>
-                  <a:schemeClr val="accent2"/>
-                </a:solidFill>
-                <a:sym typeface="Calibri"/>
-              </a:rPr>
-              <a:t>POST</a:t>
-            </a:r>
-            <a:r>
-              <a:rPr lang="fr-BE">
-                <a:sym typeface="Calibri"/>
-              </a:rPr>
-              <a:t>: envoie les données via la requête HTTP</a:t>
-            </a:r>
-          </a:p>
-          <a:p>
-            <a:pPr lvl="2"/>
-            <a:r>
-              <a:rPr lang="fr-BE">
-                <a:sym typeface="Calibri"/>
-              </a:rPr>
-              <a:t>Permet de faire transiter un plus gros nombre de caractères</a:t>
-            </a:r>
-          </a:p>
-          <a:p>
-            <a:pPr lvl="2"/>
-            <a:r>
-              <a:rPr lang="fr-BE">
-                <a:sym typeface="Calibri"/>
-              </a:rPr>
-              <a:t>Paramètres invisibles</a:t>
-            </a:r>
-          </a:p>
-          <a:p>
-            <a:r>
-              <a:rPr lang="fr-BE">
-                <a:sym typeface="Calibri"/>
-              </a:rPr>
-              <a:t>Défini avec l'attribut "</a:t>
-            </a:r>
-            <a:r>
-              <a:rPr lang="fr-BE" b="1" err="1">
+            <a:pPr marL="0" indent="0">
+              <a:buNone/>
+            </a:pPr>
+            <a:r>
+              <a:rPr lang="fr-BE" sz="3200">
                 <a:solidFill>
                   <a:schemeClr val="accent6">
                     <a:lumMod val="50000"/>
                   </a:schemeClr>
                 </a:solidFill>
-                <a:latin typeface="Courier New" panose="02070309020205020404" pitchFamily="49" charset="0"/>
-                <a:cs typeface="Courier New" panose="02070309020205020404" pitchFamily="49" charset="0"/>
-                <a:sym typeface="Courier New"/>
-              </a:rPr>
-              <a:t>method</a:t>
-            </a:r>
-            <a:r>
-              <a:rPr lang="fr-BE">
-                <a:sym typeface="Courier New"/>
-              </a:rPr>
-              <a:t>"</a:t>
-            </a:r>
-            <a:r>
-              <a:rPr lang="fr-BE">
-                <a:sym typeface="Calibri"/>
-              </a:rPr>
-              <a:t> de la balise </a:t>
-            </a:r>
-            <a:r>
-              <a:rPr lang="fr-BE" b="1">
+                <a:latin typeface="Consolas" panose="020B0609020204030204" pitchFamily="49" charset="0"/>
+                <a:cs typeface="Courier New" panose="02070309020205020404" pitchFamily="49" charset="0"/>
+                <a:sym typeface="Courier New"/>
+              </a:rPr>
+              <a:t>&lt;form method="</a:t>
+            </a:r>
+            <a:r>
+              <a:rPr lang="fr-BE" sz="3200">
+                <a:solidFill>
+                  <a:schemeClr val="accent5"/>
+                </a:solidFill>
+                <a:latin typeface="Consolas" panose="020B0609020204030204" pitchFamily="49" charset="0"/>
+                <a:cs typeface="Courier New" panose="02070309020205020404" pitchFamily="49" charset="0"/>
+                <a:sym typeface="Courier New"/>
+              </a:rPr>
+              <a:t>get</a:t>
+            </a:r>
+            <a:r>
+              <a:rPr lang="fr-BE" sz="3200">
                 <a:solidFill>
                   <a:schemeClr val="accent6">
                     <a:lumMod val="50000"/>
                   </a:schemeClr>
                 </a:solidFill>
-                <a:latin typeface="Courier New" panose="02070309020205020404" pitchFamily="49" charset="0"/>
-                <a:cs typeface="Courier New" panose="02070309020205020404" pitchFamily="49" charset="0"/>
-                <a:sym typeface="Calibri"/>
-              </a:rPr>
-              <a:t>&lt;</a:t>
-            </a:r>
-            <a:r>
-              <a:rPr lang="fr-BE" b="1" err="1">
+                <a:latin typeface="Consolas" panose="020B0609020204030204" pitchFamily="49" charset="0"/>
+                <a:cs typeface="Courier New" panose="02070309020205020404" pitchFamily="49" charset="0"/>
+                <a:sym typeface="Courier New"/>
+              </a:rPr>
+              <a:t>" action="</a:t>
+            </a:r>
+            <a:r>
+              <a:rPr lang="fr-BE" sz="3200">
+                <a:solidFill>
+                  <a:schemeClr val="accent2"/>
+                </a:solidFill>
+                <a:latin typeface="Consolas" panose="020B0609020204030204" pitchFamily="49" charset="0"/>
+                <a:cs typeface="Courier New" panose="02070309020205020404" pitchFamily="49" charset="0"/>
+                <a:sym typeface="Courier New"/>
+              </a:rPr>
+              <a:t>./register.php</a:t>
+            </a:r>
+            <a:r>
+              <a:rPr lang="fr-BE" sz="3200">
                 <a:solidFill>
                   <a:schemeClr val="accent6">
                     <a:lumMod val="50000"/>
                   </a:schemeClr>
                 </a:solidFill>
-                <a:latin typeface="Courier New" panose="02070309020205020404" pitchFamily="49" charset="0"/>
-                <a:cs typeface="Courier New" panose="02070309020205020404" pitchFamily="49" charset="0"/>
-                <a:sym typeface="Calibri"/>
-              </a:rPr>
-              <a:t>form</a:t>
-            </a:r>
-            <a:r>
-              <a:rPr lang="fr-BE" b="1">
+                <a:latin typeface="Consolas" panose="020B0609020204030204" pitchFamily="49" charset="0"/>
+                <a:cs typeface="Courier New" panose="02070309020205020404" pitchFamily="49" charset="0"/>
+                <a:sym typeface="Courier New"/>
+              </a:rPr>
+              <a:t>"&gt;</a:t>
+            </a:r>
+          </a:p>
+          <a:p>
+            <a:pPr marL="0" indent="0">
+              <a:buNone/>
+            </a:pPr>
+            <a:r>
+              <a:rPr lang="fr-BE" sz="3200">
                 <a:solidFill>
                   <a:schemeClr val="accent6">
                     <a:lumMod val="50000"/>
                   </a:schemeClr>
                 </a:solidFill>
-                <a:latin typeface="Courier New" panose="02070309020205020404" pitchFamily="49" charset="0"/>
-                <a:cs typeface="Courier New" panose="02070309020205020404" pitchFamily="49" charset="0"/>
-                <a:sym typeface="Calibri"/>
-              </a:rPr>
-              <a:t>&gt;</a:t>
-            </a:r>
-          </a:p>
-          <a:p>
-            <a:pPr marL="457189" lvl="1" indent="0">
+                <a:latin typeface="Consolas" panose="020B0609020204030204" pitchFamily="49" charset="0"/>
+                <a:cs typeface="Courier New" panose="02070309020205020404" pitchFamily="49" charset="0"/>
+                <a:sym typeface="Courier New"/>
+              </a:rPr>
+              <a:t>	...</a:t>
+            </a:r>
+          </a:p>
+          <a:p>
+            <a:pPr marL="0" indent="0">
               <a:buNone/>
             </a:pPr>
             <a:r>
-              <a:rPr lang="fr-BE" sz="2800" b="1">
+              <a:rPr lang="fr-BE" sz="3200">
                 <a:solidFill>
                   <a:schemeClr val="accent6">
                     <a:lumMod val="50000"/>
                   </a:schemeClr>
                 </a:solidFill>
-                <a:latin typeface="Courier New" panose="02070309020205020404" pitchFamily="49" charset="0"/>
-                <a:cs typeface="Courier New" panose="02070309020205020404" pitchFamily="49" charset="0"/>
-                <a:sym typeface="Calibri"/>
-              </a:rPr>
-              <a:t>&lt;</a:t>
-            </a:r>
-            <a:r>
-              <a:rPr lang="fr-BE" sz="2800" b="1" err="1">
-                <a:solidFill>
-                  <a:schemeClr val="accent6">
-                    <a:lumMod val="50000"/>
-                  </a:schemeClr>
-                </a:solidFill>
-                <a:latin typeface="Courier New" panose="02070309020205020404" pitchFamily="49" charset="0"/>
-                <a:cs typeface="Courier New" panose="02070309020205020404" pitchFamily="49" charset="0"/>
-                <a:sym typeface="Calibri"/>
-              </a:rPr>
-              <a:t>form</a:t>
-            </a:r>
-            <a:r>
-              <a:rPr lang="fr-BE" sz="2800" b="1">
-                <a:solidFill>
-                  <a:schemeClr val="accent6">
-                    <a:lumMod val="50000"/>
-                  </a:schemeClr>
-                </a:solidFill>
-                <a:latin typeface="Courier New" panose="02070309020205020404" pitchFamily="49" charset="0"/>
-                <a:cs typeface="Courier New" panose="02070309020205020404" pitchFamily="49" charset="0"/>
-                <a:sym typeface="Calibri"/>
-              </a:rPr>
-              <a:t> </a:t>
-            </a:r>
-            <a:r>
-              <a:rPr lang="fr-BE" sz="2800" b="1" err="1">
-                <a:solidFill>
-                  <a:schemeClr val="accent6">
-                    <a:lumMod val="50000"/>
-                  </a:schemeClr>
-                </a:solidFill>
-                <a:latin typeface="Courier New" panose="02070309020205020404" pitchFamily="49" charset="0"/>
-                <a:cs typeface="Courier New" panose="02070309020205020404" pitchFamily="49" charset="0"/>
-                <a:sym typeface="Courier New"/>
-              </a:rPr>
-              <a:t>method</a:t>
-            </a:r>
-            <a:r>
-              <a:rPr lang="fr-BE" sz="2800" b="1">
-                <a:solidFill>
-                  <a:schemeClr val="accent6">
-                    <a:lumMod val="50000"/>
-                  </a:schemeClr>
-                </a:solidFill>
-                <a:latin typeface="Courier New" panose="02070309020205020404" pitchFamily="49" charset="0"/>
-                <a:cs typeface="Courier New" panose="02070309020205020404" pitchFamily="49" charset="0"/>
-                <a:sym typeface="Courier New"/>
-              </a:rPr>
-              <a:t>="</a:t>
-            </a:r>
-            <a:r>
-              <a:rPr lang="fr-BE" sz="2800" b="1" err="1">
-                <a:solidFill>
-                  <a:schemeClr val="accent6">
-                    <a:lumMod val="50000"/>
-                  </a:schemeClr>
-                </a:solidFill>
-                <a:latin typeface="Courier New" panose="02070309020205020404" pitchFamily="49" charset="0"/>
-                <a:cs typeface="Courier New" panose="02070309020205020404" pitchFamily="49" charset="0"/>
-                <a:sym typeface="Courier New"/>
-              </a:rPr>
-              <a:t>get</a:t>
-            </a:r>
-            <a:r>
-              <a:rPr lang="fr-BE" sz="2800" b="1">
-                <a:solidFill>
-                  <a:schemeClr val="accent6">
-                    <a:lumMod val="50000"/>
-                  </a:schemeClr>
-                </a:solidFill>
-                <a:latin typeface="Courier New" panose="02070309020205020404" pitchFamily="49" charset="0"/>
-                <a:cs typeface="Courier New" panose="02070309020205020404" pitchFamily="49" charset="0"/>
-                <a:sym typeface="Courier New"/>
-              </a:rPr>
-              <a:t>" …</a:t>
-            </a:r>
-          </a:p>
-          <a:p>
-            <a:pPr marL="457189" lvl="1" indent="0">
-              <a:buNone/>
-            </a:pPr>
-            <a:r>
-              <a:rPr lang="fr-BE" sz="2800" b="1">
-                <a:solidFill>
-                  <a:schemeClr val="accent6">
-                    <a:lumMod val="50000"/>
-                  </a:schemeClr>
-                </a:solidFill>
-                <a:latin typeface="Courier New" panose="02070309020205020404" pitchFamily="49" charset="0"/>
-                <a:cs typeface="Courier New" panose="02070309020205020404" pitchFamily="49" charset="0"/>
-                <a:sym typeface="Calibri"/>
-              </a:rPr>
-              <a:t>&lt;</a:t>
-            </a:r>
-            <a:r>
-              <a:rPr lang="fr-BE" sz="2800" b="1" err="1">
-                <a:solidFill>
-                  <a:schemeClr val="accent6">
-                    <a:lumMod val="50000"/>
-                  </a:schemeClr>
-                </a:solidFill>
-                <a:latin typeface="Courier New" panose="02070309020205020404" pitchFamily="49" charset="0"/>
-                <a:cs typeface="Courier New" panose="02070309020205020404" pitchFamily="49" charset="0"/>
-                <a:sym typeface="Calibri"/>
-              </a:rPr>
-              <a:t>form</a:t>
-            </a:r>
-            <a:r>
-              <a:rPr lang="fr-BE" sz="2800" b="1">
-                <a:solidFill>
-                  <a:schemeClr val="accent6">
-                    <a:lumMod val="50000"/>
-                  </a:schemeClr>
-                </a:solidFill>
-                <a:latin typeface="Courier New" panose="02070309020205020404" pitchFamily="49" charset="0"/>
-                <a:cs typeface="Courier New" panose="02070309020205020404" pitchFamily="49" charset="0"/>
-                <a:sym typeface="Calibri"/>
-              </a:rPr>
-              <a:t> </a:t>
-            </a:r>
-            <a:r>
-              <a:rPr lang="fr-BE" sz="2800" b="1" err="1">
-                <a:solidFill>
-                  <a:schemeClr val="accent6">
-                    <a:lumMod val="50000"/>
-                  </a:schemeClr>
-                </a:solidFill>
-                <a:latin typeface="Courier New" panose="02070309020205020404" pitchFamily="49" charset="0"/>
-                <a:cs typeface="Courier New" panose="02070309020205020404" pitchFamily="49" charset="0"/>
-                <a:sym typeface="Courier New"/>
-              </a:rPr>
-              <a:t>method</a:t>
-            </a:r>
-            <a:r>
-              <a:rPr lang="fr-BE" sz="2800" b="1">
-                <a:solidFill>
-                  <a:schemeClr val="accent6">
-                    <a:lumMod val="50000"/>
-                  </a:schemeClr>
-                </a:solidFill>
-                <a:latin typeface="Courier New" panose="02070309020205020404" pitchFamily="49" charset="0"/>
-                <a:cs typeface="Courier New" panose="02070309020205020404" pitchFamily="49" charset="0"/>
-                <a:sym typeface="Courier New"/>
-              </a:rPr>
-              <a:t>="post" …</a:t>
+                <a:latin typeface="Consolas" panose="020B0609020204030204" pitchFamily="49" charset="0"/>
+                <a:cs typeface="Courier New" panose="02070309020205020404" pitchFamily="49" charset="0"/>
+                <a:sym typeface="Courier New"/>
+              </a:rPr>
+              <a:t>&lt;/form&gt;</a:t>
             </a:r>
           </a:p>
         </p:txBody>
@@ -14533,7 +14055,7 @@
     </p:spTree>
     <p:extLst>
       <p:ext uri="{BB962C8B-B14F-4D97-AF65-F5344CB8AC3E}">
-        <p14:creationId xmlns:p14="http://schemas.microsoft.com/office/powerpoint/2010/main" val="1761849454"/>
+        <p14:creationId xmlns:p14="http://schemas.microsoft.com/office/powerpoint/2010/main" val="2573610486"/>
       </p:ext>
     </p:extLst>
   </p:cSld>
@@ -14560,7 +14082,7 @@
   <p:cSld>
     <p:spTree>
       <p:nvGrpSpPr>
-        <p:cNvPr id="1" name="Shape 55"/>
+        <p:cNvPr id="1" name=""/>
         <p:cNvGrpSpPr/>
         <p:nvPr/>
       </p:nvGrpSpPr>
@@ -14574,8 +14096,14 @@
       </p:grpSpPr>
       <p:sp>
         <p:nvSpPr>
-          <p:cNvPr id="56" name="Google Shape;56;p11"/>
-          <p:cNvSpPr txBox="1">
+          <p:cNvPr id="4" name="Titre 3">
+            <a:extLst>
+              <a:ext uri="{FF2B5EF4-FFF2-40B4-BE49-F238E27FC236}">
+                <a16:creationId xmlns:a16="http://schemas.microsoft.com/office/drawing/2014/main" id="{6BC2345B-F403-44E5-97C3-F5BDF024DC43}"/>
+              </a:ext>
+            </a:extLst>
+          </p:cNvPr>
+          <p:cNvSpPr>
             <a:spLocks noGrp="1"/>
           </p:cNvSpPr>
           <p:nvPr>
@@ -14591,19 +14119,26 @@
               <a:rPr lang="fr-BE">
                 <a:sym typeface="Calibri"/>
               </a:rPr>
-              <a:t>Comment traiter les données?</a:t>
-            </a:r>
-          </a:p>
-        </p:txBody>
-      </p:sp>
-      <p:sp>
-        <p:nvSpPr>
-          <p:cNvPr id="57" name="Google Shape;57;p11"/>
-          <p:cNvSpPr txBox="1">
+              <a:t>Balises HTML</a:t>
+            </a:r>
+            <a:endParaRPr lang="fr-BE"/>
+          </a:p>
+        </p:txBody>
+      </p:sp>
+      <p:sp>
+        <p:nvSpPr>
+          <p:cNvPr id="2" name="Espace réservé du texte 1">
+            <a:extLst>
+              <a:ext uri="{FF2B5EF4-FFF2-40B4-BE49-F238E27FC236}">
+                <a16:creationId xmlns:a16="http://schemas.microsoft.com/office/drawing/2014/main" id="{476AB62D-B7ED-86E3-C02B-C782347789A9}"/>
+              </a:ext>
+            </a:extLst>
+          </p:cNvPr>
+          <p:cNvSpPr>
             <a:spLocks noGrp="1"/>
           </p:cNvSpPr>
           <p:nvPr>
-            <p:ph idx="1"/>
+            <p:ph type="body" idx="1"/>
           </p:nvPr>
         </p:nvSpPr>
         <p:spPr/>
@@ -14611,79 +14146,53 @@
           <a:bodyPr/>
           <a:lstStyle/>
           <a:p>
-            <a:r>
-              <a:rPr lang="fr-BE">
-                <a:sym typeface="Calibri"/>
-              </a:rPr>
-              <a:t>Il faut envoyer la requête contenant les données du formulaire (via GET ou POST) à un </a:t>
-            </a:r>
-            <a:r>
-              <a:rPr lang="fr-BE">
-                <a:solidFill>
-                  <a:schemeClr val="accent2"/>
-                </a:solidFill>
-                <a:sym typeface="Calibri"/>
-              </a:rPr>
-              <a:t>script</a:t>
-            </a:r>
-            <a:r>
-              <a:rPr lang="fr-BE">
-                <a:sym typeface="Calibri"/>
-              </a:rPr>
-              <a:t> qui pourra les traiter (ex. page contenant du PHP)</a:t>
-            </a:r>
-          </a:p>
-          <a:p>
-            <a:r>
-              <a:rPr lang="fr-BE">
-                <a:sym typeface="Calibri"/>
-              </a:rPr>
-              <a:t>Défini avec l'attribut </a:t>
-            </a:r>
-            <a:r>
-              <a:rPr lang="fr-BE">
-                <a:sym typeface="Courier New"/>
-              </a:rPr>
-              <a:t>action</a:t>
-            </a:r>
-          </a:p>
-          <a:p>
-            <a:pPr marL="457189" lvl="1" indent="0">
-              <a:buNone/>
-            </a:pPr>
-            <a:r>
-              <a:rPr lang="fr-BE" sz="2800" b="1">
-                <a:solidFill>
-                  <a:schemeClr val="accent6">
-                    <a:lumMod val="50000"/>
-                  </a:schemeClr>
-                </a:solidFill>
-                <a:latin typeface="Courier New" panose="02070309020205020404" pitchFamily="49" charset="0"/>
-                <a:cs typeface="Courier New" panose="02070309020205020404" pitchFamily="49" charset="0"/>
-                <a:sym typeface="Calibri"/>
-              </a:rPr>
-              <a:t>&lt;form </a:t>
-            </a:r>
-            <a:r>
-              <a:rPr lang="fr-BE" sz="2800" b="1">
-                <a:solidFill>
-                  <a:schemeClr val="accent6">
-                    <a:lumMod val="50000"/>
-                  </a:schemeClr>
-                </a:solidFill>
-                <a:latin typeface="Courier New" panose="02070309020205020404" pitchFamily="49" charset="0"/>
-                <a:cs typeface="Courier New" panose="02070309020205020404" pitchFamily="49" charset="0"/>
-                <a:sym typeface="Courier New"/>
-              </a:rPr>
-              <a:t>method="get" action="./register.php" …</a:t>
-            </a:r>
-          </a:p>
-        </p:txBody>
-      </p:sp>
+            <a:endParaRPr lang="fr-BE"/>
+          </a:p>
+        </p:txBody>
+      </p:sp>
+      <p:pic>
+        <p:nvPicPr>
+          <p:cNvPr id="6" name="Google Shape;39;p8">
+            <a:hlinkClick r:id="rId2"/>
+            <a:extLst>
+              <a:ext uri="{FF2B5EF4-FFF2-40B4-BE49-F238E27FC236}">
+                <a16:creationId xmlns:a16="http://schemas.microsoft.com/office/drawing/2014/main" id="{F73F5139-A5C5-497C-AE5C-231EBB7AE61F}"/>
+              </a:ext>
+            </a:extLst>
+          </p:cNvPr>
+          <p:cNvPicPr preferRelativeResize="0">
+            <a:picLocks noGrp="1"/>
+          </p:cNvPicPr>
+          <p:nvPr>
+            <p:ph type="pic" sz="quarter" idx="10"/>
+          </p:nvPr>
+        </p:nvPicPr>
+        <p:blipFill>
+          <a:blip r:embed="rId3" cstate="email">
+            <a:alphaModFix/>
+            <a:extLst>
+              <a:ext uri="{28A0092B-C50C-407E-A947-70E740481C1C}">
+                <a14:useLocalDpi xmlns:a14="http://schemas.microsoft.com/office/drawing/2010/main"/>
+              </a:ext>
+            </a:extLst>
+          </a:blip>
+          <a:srcRect t="37" b="37"/>
+          <a:stretch/>
+        </p:blipFill>
+        <p:spPr>
+          <a:prstGeom prst="rect">
+            <a:avLst/>
+          </a:prstGeom>
+          <a:noFill/>
+          <a:ln>
+            <a:noFill/>
+          </a:ln>
+        </p:spPr>
+      </p:pic>
     </p:spTree>
     <p:extLst>
       <p:ext uri="{BB962C8B-B14F-4D97-AF65-F5344CB8AC3E}">
-        <p14:creationId xmlns:p14="http://schemas.microsoft.com/office/powerpoint/2010/main" val="1654815679"/>
+        <p14:creationId xmlns:p14="http://schemas.microsoft.com/office/powerpoint/2010/main" val="3335409893"/>
       </p:ext>
     </p:extLst>
   </p:cSld>

</xml_diff>